<commit_message>
Update slide & Kich Ban Demo.doc
</commit_message>
<xml_diff>
--- a/branches/Final Documents/iDeliver presentation.pptx
+++ b/branches/Final Documents/iDeliver presentation.pptx
@@ -5,10 +5,10 @@
     <p:sldMasterId id="2147483660" r:id="rId1"/>
   </p:sldMasterIdLst>
   <p:notesMasterIdLst>
-    <p:notesMasterId r:id="rId22"/>
+    <p:notesMasterId r:id="rId20"/>
   </p:notesMasterIdLst>
   <p:handoutMasterIdLst>
-    <p:handoutMasterId r:id="rId23"/>
+    <p:handoutMasterId r:id="rId21"/>
   </p:handoutMasterIdLst>
   <p:sldIdLst>
     <p:sldId id="283" r:id="rId2"/>
@@ -20,17 +20,15 @@
     <p:sldId id="276" r:id="rId8"/>
     <p:sldId id="259" r:id="rId9"/>
     <p:sldId id="260" r:id="rId10"/>
-    <p:sldId id="261" r:id="rId11"/>
-    <p:sldId id="262" r:id="rId12"/>
+    <p:sldId id="262" r:id="rId11"/>
+    <p:sldId id="261" r:id="rId12"/>
     <p:sldId id="263" r:id="rId13"/>
-    <p:sldId id="264" r:id="rId14"/>
-    <p:sldId id="265" r:id="rId15"/>
-    <p:sldId id="266" r:id="rId16"/>
-    <p:sldId id="278" r:id="rId17"/>
-    <p:sldId id="279" r:id="rId18"/>
-    <p:sldId id="277" r:id="rId19"/>
-    <p:sldId id="280" r:id="rId20"/>
-    <p:sldId id="281" r:id="rId21"/>
+    <p:sldId id="265" r:id="rId14"/>
+    <p:sldId id="278" r:id="rId15"/>
+    <p:sldId id="279" r:id="rId16"/>
+    <p:sldId id="277" r:id="rId17"/>
+    <p:sldId id="280" r:id="rId18"/>
+    <p:sldId id="281" r:id="rId19"/>
   </p:sldIdLst>
   <p:sldSz cx="9144000" cy="6858000" type="screen4x3"/>
   <p:notesSz cx="6858000" cy="9144000"/>
@@ -2885,22 +2883,22 @@
     </dgm:pt>
   </dgm:ptLst>
   <dgm:cxnLst>
+    <dgm:cxn modelId="{8FC5C53C-E0D2-4D9E-921A-D5BAB0691AEA}" type="presOf" srcId="{F15AB5BC-20EB-4896-ACF0-5A5E624E7B6C}" destId="{2122FC3D-9D7C-4674-9A64-60A76FF473D7}" srcOrd="1" destOrd="0" presId="urn:microsoft.com/office/officeart/2005/8/layout/list1"/>
+    <dgm:cxn modelId="{F872DC09-BB93-40DD-AC2E-02BB8F8E24F7}" type="presOf" srcId="{50966B18-8F4F-4052-89F9-B48790BD2367}" destId="{F8B1D1CA-F8B8-4CF2-850D-8A08A6D43348}" srcOrd="0" destOrd="0" presId="urn:microsoft.com/office/officeart/2005/8/layout/list1"/>
+    <dgm:cxn modelId="{895819B1-9F28-4D90-ACDF-9FE810992A71}" srcId="{EDC7A38C-A6DB-4DC5-A689-39ECF460C6EE}" destId="{F3861C03-805D-46DF-A473-53653EFDEFAC}" srcOrd="0" destOrd="0" parTransId="{FDEF765C-797E-4575-A57A-62FC58C0DBBD}" sibTransId="{4B94263F-AE36-49BA-90BC-B9C0A3836F11}"/>
+    <dgm:cxn modelId="{491C81F4-6429-47C7-A66F-7BFF0E79B08D}" type="presOf" srcId="{4EF90078-E6E6-4945-AFF6-3CE122D73B62}" destId="{E2681A2F-F14D-4CA1-AED2-F51532E386C0}" srcOrd="1" destOrd="0" presId="urn:microsoft.com/office/officeart/2005/8/layout/list1"/>
+    <dgm:cxn modelId="{62A679E3-6E81-49B3-9E2D-5E7AB7AFAAB0}" srcId="{EDC7A38C-A6DB-4DC5-A689-39ECF460C6EE}" destId="{F15AB5BC-20EB-4896-ACF0-5A5E624E7B6C}" srcOrd="1" destOrd="0" parTransId="{D72D90E7-2791-440A-BD7C-BF567269DBF7}" sibTransId="{491206DF-53A9-45C6-A28A-60F01CAC4067}"/>
+    <dgm:cxn modelId="{75735154-E353-4CB6-A313-260C53D45645}" type="presOf" srcId="{50966B18-8F4F-4052-89F9-B48790BD2367}" destId="{7AA6AE93-8789-4D56-BCEC-D6B55D847325}" srcOrd="1" destOrd="0" presId="urn:microsoft.com/office/officeart/2005/8/layout/list1"/>
+    <dgm:cxn modelId="{E9E9A78E-3D06-4434-9596-2811CFE08B6F}" type="presOf" srcId="{4EF90078-E6E6-4945-AFF6-3CE122D73B62}" destId="{5C8FE5E1-884F-412E-A725-A291A47A8E59}" srcOrd="0" destOrd="0" presId="urn:microsoft.com/office/officeart/2005/8/layout/list1"/>
+    <dgm:cxn modelId="{B939CA61-FB1E-4148-98F6-EABDDE961BD5}" srcId="{EDC7A38C-A6DB-4DC5-A689-39ECF460C6EE}" destId="{50966B18-8F4F-4052-89F9-B48790BD2367}" srcOrd="2" destOrd="0" parTransId="{C781F25A-CB4B-44C1-A33E-F87A8D09F246}" sibTransId="{5D4359EE-B0D4-4E7C-8140-B2A89C1D7FF5}"/>
     <dgm:cxn modelId="{D511B19E-2229-41BF-A87F-557FEE21CBCC}" type="presOf" srcId="{EDC7A38C-A6DB-4DC5-A689-39ECF460C6EE}" destId="{12349A56-4627-47C6-95E1-59A3763AA6E1}" srcOrd="0" destOrd="0" presId="urn:microsoft.com/office/officeart/2005/8/layout/list1"/>
+    <dgm:cxn modelId="{B6DE7BDF-0007-4DDE-B412-4B6F0561ED64}" type="presOf" srcId="{2511DA9D-D953-4E88-85D7-486DCAA95676}" destId="{1B03F452-E806-41D8-9F69-D88626BB3B32}" srcOrd="0" destOrd="0" presId="urn:microsoft.com/office/officeart/2005/8/layout/list1"/>
     <dgm:cxn modelId="{E9ECDBE4-4B3F-4965-BC46-77193A10C313}" type="presOf" srcId="{F15AB5BC-20EB-4896-ACF0-5A5E624E7B6C}" destId="{ED16CCA2-3479-4C2F-9EE1-3E315BF03D68}" srcOrd="0" destOrd="0" presId="urn:microsoft.com/office/officeart/2005/8/layout/list1"/>
-    <dgm:cxn modelId="{EADFDE52-5B58-4A6D-AB10-BDF6EB79B1DE}" type="presOf" srcId="{F3861C03-805D-46DF-A473-53653EFDEFAC}" destId="{F5161C34-E6C6-424C-AFB0-D1DCB70063F9}" srcOrd="0" destOrd="0" presId="urn:microsoft.com/office/officeart/2005/8/layout/list1"/>
-    <dgm:cxn modelId="{B939CA61-FB1E-4148-98F6-EABDDE961BD5}" srcId="{EDC7A38C-A6DB-4DC5-A689-39ECF460C6EE}" destId="{50966B18-8F4F-4052-89F9-B48790BD2367}" srcOrd="2" destOrd="0" parTransId="{C781F25A-CB4B-44C1-A33E-F87A8D09F246}" sibTransId="{5D4359EE-B0D4-4E7C-8140-B2A89C1D7FF5}"/>
-    <dgm:cxn modelId="{895819B1-9F28-4D90-ACDF-9FE810992A71}" srcId="{EDC7A38C-A6DB-4DC5-A689-39ECF460C6EE}" destId="{F3861C03-805D-46DF-A473-53653EFDEFAC}" srcOrd="0" destOrd="0" parTransId="{FDEF765C-797E-4575-A57A-62FC58C0DBBD}" sibTransId="{4B94263F-AE36-49BA-90BC-B9C0A3836F11}"/>
-    <dgm:cxn modelId="{8FC5C53C-E0D2-4D9E-921A-D5BAB0691AEA}" type="presOf" srcId="{F15AB5BC-20EB-4896-ACF0-5A5E624E7B6C}" destId="{2122FC3D-9D7C-4674-9A64-60A76FF473D7}" srcOrd="1" destOrd="0" presId="urn:microsoft.com/office/officeart/2005/8/layout/list1"/>
-    <dgm:cxn modelId="{E9E9A78E-3D06-4434-9596-2811CFE08B6F}" type="presOf" srcId="{4EF90078-E6E6-4945-AFF6-3CE122D73B62}" destId="{5C8FE5E1-884F-412E-A725-A291A47A8E59}" srcOrd="0" destOrd="0" presId="urn:microsoft.com/office/officeart/2005/8/layout/list1"/>
-    <dgm:cxn modelId="{491C81F4-6429-47C7-A66F-7BFF0E79B08D}" type="presOf" srcId="{4EF90078-E6E6-4945-AFF6-3CE122D73B62}" destId="{E2681A2F-F14D-4CA1-AED2-F51532E386C0}" srcOrd="1" destOrd="0" presId="urn:microsoft.com/office/officeart/2005/8/layout/list1"/>
     <dgm:cxn modelId="{ACA434B3-DE1A-47D9-A07E-3EE677AE4A87}" type="presOf" srcId="{F3861C03-805D-46DF-A473-53653EFDEFAC}" destId="{4BCFC962-7C53-4C3E-A79A-F8EA1F40FB77}" srcOrd="1" destOrd="0" presId="urn:microsoft.com/office/officeart/2005/8/layout/list1"/>
-    <dgm:cxn modelId="{62A679E3-6E81-49B3-9E2D-5E7AB7AFAAB0}" srcId="{EDC7A38C-A6DB-4DC5-A689-39ECF460C6EE}" destId="{F15AB5BC-20EB-4896-ACF0-5A5E624E7B6C}" srcOrd="1" destOrd="0" parTransId="{D72D90E7-2791-440A-BD7C-BF567269DBF7}" sibTransId="{491206DF-53A9-45C6-A28A-60F01CAC4067}"/>
-    <dgm:cxn modelId="{C012B5AC-4085-426B-BA31-5E62062BF963}" srcId="{EDC7A38C-A6DB-4DC5-A689-39ECF460C6EE}" destId="{4EF90078-E6E6-4945-AFF6-3CE122D73B62}" srcOrd="3" destOrd="0" parTransId="{09C9B5E1-25C3-4E5E-AD04-49DF3B553086}" sibTransId="{AE2A650F-D5C1-43DF-9F83-849BA50274C2}"/>
-    <dgm:cxn modelId="{75735154-E353-4CB6-A313-260C53D45645}" type="presOf" srcId="{50966B18-8F4F-4052-89F9-B48790BD2367}" destId="{7AA6AE93-8789-4D56-BCEC-D6B55D847325}" srcOrd="1" destOrd="0" presId="urn:microsoft.com/office/officeart/2005/8/layout/list1"/>
-    <dgm:cxn modelId="{B6DE7BDF-0007-4DDE-B412-4B6F0561ED64}" type="presOf" srcId="{2511DA9D-D953-4E88-85D7-486DCAA95676}" destId="{1B03F452-E806-41D8-9F69-D88626BB3B32}" srcOrd="0" destOrd="0" presId="urn:microsoft.com/office/officeart/2005/8/layout/list1"/>
-    <dgm:cxn modelId="{F872DC09-BB93-40DD-AC2E-02BB8F8E24F7}" type="presOf" srcId="{50966B18-8F4F-4052-89F9-B48790BD2367}" destId="{F8B1D1CA-F8B8-4CF2-850D-8A08A6D43348}" srcOrd="0" destOrd="0" presId="urn:microsoft.com/office/officeart/2005/8/layout/list1"/>
     <dgm:cxn modelId="{6A8FF732-B4B4-4D17-AEEF-1FC21937469E}" type="presOf" srcId="{2511DA9D-D953-4E88-85D7-486DCAA95676}" destId="{A2F44CA5-7572-4B10-8094-A7E02486FABF}" srcOrd="1" destOrd="0" presId="urn:microsoft.com/office/officeart/2005/8/layout/list1"/>
     <dgm:cxn modelId="{443A4200-1FAC-4F0C-AB59-DBDB9E58150F}" srcId="{EDC7A38C-A6DB-4DC5-A689-39ECF460C6EE}" destId="{2511DA9D-D953-4E88-85D7-486DCAA95676}" srcOrd="4" destOrd="0" parTransId="{FFC15986-DDEE-40E7-86E3-050BDF619BE7}" sibTransId="{87DF7139-E210-4101-AEDE-4DE92254736F}"/>
+    <dgm:cxn modelId="{C012B5AC-4085-426B-BA31-5E62062BF963}" srcId="{EDC7A38C-A6DB-4DC5-A689-39ECF460C6EE}" destId="{4EF90078-E6E6-4945-AFF6-3CE122D73B62}" srcOrd="3" destOrd="0" parTransId="{09C9B5E1-25C3-4E5E-AD04-49DF3B553086}" sibTransId="{AE2A650F-D5C1-43DF-9F83-849BA50274C2}"/>
+    <dgm:cxn modelId="{EADFDE52-5B58-4A6D-AB10-BDF6EB79B1DE}" type="presOf" srcId="{F3861C03-805D-46DF-A473-53653EFDEFAC}" destId="{F5161C34-E6C6-424C-AFB0-D1DCB70063F9}" srcOrd="0" destOrd="0" presId="urn:microsoft.com/office/officeart/2005/8/layout/list1"/>
     <dgm:cxn modelId="{A5C55C8A-FE5F-4D8D-9361-332699CFA204}" type="presParOf" srcId="{12349A56-4627-47C6-95E1-59A3763AA6E1}" destId="{4C00E976-8666-4597-95C1-88AFE21BB0A3}" srcOrd="0" destOrd="0" presId="urn:microsoft.com/office/officeart/2005/8/layout/list1"/>
     <dgm:cxn modelId="{AF596160-38EF-493E-AD36-5132F7C884BA}" type="presParOf" srcId="{4C00E976-8666-4597-95C1-88AFE21BB0A3}" destId="{F5161C34-E6C6-424C-AFB0-D1DCB70063F9}" srcOrd="0" destOrd="0" presId="urn:microsoft.com/office/officeart/2005/8/layout/list1"/>
     <dgm:cxn modelId="{2EC1E1E5-E010-4D2F-8E22-1F399244BCDA}" type="presParOf" srcId="{4C00E976-8666-4597-95C1-88AFE21BB0A3}" destId="{4BCFC962-7C53-4C3E-A79A-F8EA1F40FB77}" srcOrd="1" destOrd="0" presId="urn:microsoft.com/office/officeart/2005/8/layout/list1"/>
@@ -10869,7 +10867,7 @@
           <a:p>
             <a:fld id="{8CF011AB-31B9-4FEE-9201-64BC297EEACF}" type="datetimeFigureOut">
               <a:rPr lang="en-US" smtClean="0"/>
-              <a:t>05/05/2014</a:t>
+              <a:t>5/5/2014</a:t>
             </a:fld>
             <a:endParaRPr lang="en-US"/>
           </a:p>
@@ -11035,7 +11033,7 @@
           <a:p>
             <a:fld id="{EEB917EA-0A47-475B-9CE2-61BBD17C3321}" type="datetimeFigureOut">
               <a:rPr lang="en-US" smtClean="0"/>
-              <a:t>05/05/2014</a:t>
+              <a:t>5/5/2014</a:t>
             </a:fld>
             <a:endParaRPr lang="en-US"/>
           </a:p>
@@ -13582,7 +13580,7 @@
           <a:graphicData uri="http://schemas.openxmlformats.org/presentationml/2006/ole">
             <mc:AlternateContent xmlns:mc="http://schemas.openxmlformats.org/markup-compatibility/2006">
               <mc:Choice xmlns:v="urn:schemas-microsoft-com:vml" Requires="v">
-                <p:oleObj spid="_x0000_s2490" name="Image" r:id="rId15" imgW="6311111" imgH="1155148" progId="">
+                <p:oleObj spid="_x0000_s2517" name="Image" r:id="rId15" imgW="6311111" imgH="1155148" progId="">
                   <p:embed/>
                 </p:oleObj>
               </mc:Choice>
@@ -15036,8 +15034,300 @@
           <a:lstStyle/>
           <a:p>
             <a:r>
+              <a:rPr lang="en-US" sz="3000" b="1" dirty="0" smtClean="0"/>
+              <a:t>Three main steps</a:t>
+            </a:r>
+            <a:endParaRPr lang="en-US" sz="3000" b="1" dirty="0"/>
+          </a:p>
+        </p:txBody>
+      </p:sp>
+      <p:sp>
+        <p:nvSpPr>
+          <p:cNvPr id="3" name="Content Placeholder 2"/>
+          <p:cNvSpPr>
+            <a:spLocks noGrp="1"/>
+          </p:cNvSpPr>
+          <p:nvPr>
+            <p:ph idx="1"/>
+          </p:nvPr>
+        </p:nvSpPr>
+        <p:spPr>
+          <a:xfrm>
+            <a:off x="228600" y="1600200"/>
+            <a:ext cx="8763000" cy="3940175"/>
+          </a:xfrm>
+        </p:spPr>
+        <p:txBody>
+          <a:bodyPr/>
+          <a:lstStyle/>
+          <a:p>
+            <a:pPr algn="just">
+              <a:buFont typeface="Courier New" pitchFamily="49" charset="0"/>
+              <a:buChar char="o"/>
+            </a:pPr>
+            <a:r>
+              <a:rPr lang="en-US" sz="2700" dirty="0" smtClean="0"/>
+              <a:t>Step 1</a:t>
+            </a:r>
+            <a:r>
+              <a:rPr lang="en-US" sz="2700" b="0" dirty="0" smtClean="0"/>
+              <a:t>: check if request can be delivered on </a:t>
+            </a:r>
+            <a:r>
+              <a:rPr lang="en-US" sz="2700" dirty="0" smtClean="0"/>
+              <a:t>one trip </a:t>
+            </a:r>
+            <a:r>
+              <a:rPr lang="en-US" sz="2700" b="0" dirty="0" smtClean="0"/>
+              <a:t>starts at A and end at B.</a:t>
+            </a:r>
+          </a:p>
+          <a:p>
+            <a:pPr algn="just">
+              <a:buFont typeface="Courier New" pitchFamily="49" charset="0"/>
+              <a:buChar char="o"/>
+            </a:pPr>
+            <a:r>
+              <a:rPr lang="en-US" sz="2700" dirty="0" smtClean="0"/>
+              <a:t>Step 2</a:t>
+            </a:r>
+            <a:r>
+              <a:rPr lang="en-US" sz="2700" b="0" dirty="0" smtClean="0"/>
+              <a:t>: </a:t>
+            </a:r>
+            <a:r>
+              <a:rPr lang="en-US" sz="2700" b="0" dirty="0"/>
+              <a:t>check if request </a:t>
+            </a:r>
+            <a:r>
+              <a:rPr lang="en-US" sz="2700" b="0" dirty="0" smtClean="0"/>
+              <a:t>can be delivered by </a:t>
+            </a:r>
+            <a:r>
+              <a:rPr lang="en-US" sz="2700" dirty="0" smtClean="0"/>
+              <a:t>multiple trips </a:t>
+            </a:r>
+            <a:r>
+              <a:rPr lang="en-US" sz="2700" b="0" dirty="0" smtClean="0"/>
+              <a:t>that starts/ends at stations of the found way.</a:t>
+            </a:r>
+          </a:p>
+          <a:p>
+            <a:pPr algn="just">
+              <a:buFont typeface="Courier New" pitchFamily="49" charset="0"/>
+              <a:buChar char="o"/>
+            </a:pPr>
+            <a:r>
+              <a:rPr lang="en-US" sz="2700" dirty="0" smtClean="0"/>
+              <a:t>Step 3</a:t>
+            </a:r>
+            <a:r>
+              <a:rPr lang="en-US" sz="2700" b="0" dirty="0" smtClean="0"/>
+              <a:t>: </a:t>
+            </a:r>
+            <a:r>
+              <a:rPr lang="en-US" sz="2700" b="0" dirty="0"/>
+              <a:t>check if request can be delivered by </a:t>
+            </a:r>
+            <a:r>
+              <a:rPr lang="en-US" sz="2700" dirty="0" smtClean="0"/>
+              <a:t>multiple trips</a:t>
+            </a:r>
+            <a:r>
+              <a:rPr lang="en-US" sz="2700" b="0" dirty="0" smtClean="0"/>
+              <a:t> and its may be </a:t>
+            </a:r>
+            <a:r>
+              <a:rPr lang="en-US" sz="2700" dirty="0" smtClean="0"/>
+              <a:t>transferred at middle of way</a:t>
+            </a:r>
+            <a:r>
+              <a:rPr lang="en-US" sz="2700" b="0" dirty="0" smtClean="0"/>
+              <a:t>.</a:t>
+            </a:r>
+            <a:endParaRPr lang="en-US" sz="2700" b="0" dirty="0"/>
+          </a:p>
+        </p:txBody>
+      </p:sp>
+      <p:pic>
+        <p:nvPicPr>
+          <p:cNvPr id="12290" name="Picture 2" descr="C:\Users\Le Phuc Lu\Desktop\Capture.PNG"/>
+          <p:cNvPicPr>
+            <a:picLocks noChangeAspect="1" noChangeArrowheads="1"/>
+          </p:cNvPicPr>
+          <p:nvPr/>
+        </p:nvPicPr>
+        <p:blipFill>
+          <a:blip r:embed="rId2">
+            <a:extLst>
+              <a:ext uri="{28A0092B-C50C-407E-A947-70E740481C1C}">
+                <a14:useLocalDpi xmlns:a14="http://schemas.microsoft.com/office/drawing/2010/main" val="0"/>
+              </a:ext>
+            </a:extLst>
+          </a:blip>
+          <a:srcRect/>
+          <a:stretch>
+            <a:fillRect/>
+          </a:stretch>
+        </p:blipFill>
+        <p:spPr bwMode="auto">
+          <a:xfrm>
+            <a:off x="7086600" y="6616906"/>
+            <a:ext cx="1676400" cy="238125"/>
+          </a:xfrm>
+          <a:prstGeom prst="rect">
+            <a:avLst/>
+          </a:prstGeom>
+          <a:noFill/>
+          <a:extLst>
+            <a:ext uri="{909E8E84-426E-40DD-AFC4-6F175D3DCCD1}">
+              <a14:hiddenFill xmlns:a14="http://schemas.microsoft.com/office/drawing/2010/main">
+                <a:solidFill>
+                  <a:srgbClr val="FFFFFF"/>
+                </a:solidFill>
+              </a14:hiddenFill>
+            </a:ext>
+          </a:extLst>
+        </p:spPr>
+      </p:pic>
+      <p:pic>
+        <p:nvPicPr>
+          <p:cNvPr id="5" name="Picture 3" descr="C:\Users\Le Phuc Lu\Desktop\1.PNG"/>
+          <p:cNvPicPr>
+            <a:picLocks noChangeAspect="1" noChangeArrowheads="1"/>
+          </p:cNvPicPr>
+          <p:nvPr/>
+        </p:nvPicPr>
+        <p:blipFill>
+          <a:blip r:embed="rId3">
+            <a:extLst>
+              <a:ext uri="{28A0092B-C50C-407E-A947-70E740481C1C}">
+                <a14:useLocalDpi xmlns:a14="http://schemas.microsoft.com/office/drawing/2010/main" val="0"/>
+              </a:ext>
+            </a:extLst>
+          </a:blip>
+          <a:srcRect/>
+          <a:stretch>
+            <a:fillRect/>
+          </a:stretch>
+        </p:blipFill>
+        <p:spPr bwMode="auto">
+          <a:xfrm>
+            <a:off x="6858000" y="0"/>
+            <a:ext cx="1828800" cy="217410"/>
+          </a:xfrm>
+          <a:prstGeom prst="rect">
+            <a:avLst/>
+          </a:prstGeom>
+          <a:noFill/>
+          <a:extLst>
+            <a:ext uri="{909E8E84-426E-40DD-AFC4-6F175D3DCCD1}">
+              <a14:hiddenFill xmlns:a14="http://schemas.microsoft.com/office/drawing/2010/main">
+                <a:solidFill>
+                  <a:srgbClr val="FFFFFF"/>
+                </a:solidFill>
+              </a14:hiddenFill>
+            </a:ext>
+          </a:extLst>
+        </p:spPr>
+      </p:pic>
+      <p:sp>
+        <p:nvSpPr>
+          <p:cNvPr id="6" name="Oval 5"/>
+          <p:cNvSpPr/>
+          <p:nvPr/>
+        </p:nvSpPr>
+        <p:spPr>
+          <a:xfrm>
+            <a:off x="8077200" y="6324600"/>
+            <a:ext cx="990600" cy="457200"/>
+          </a:xfrm>
+          <a:prstGeom prst="ellipse">
+            <a:avLst/>
+          </a:prstGeom>
+        </p:spPr>
+        <p:style>
+          <a:lnRef idx="0">
+            <a:schemeClr val="accent1"/>
+          </a:lnRef>
+          <a:fillRef idx="3">
+            <a:schemeClr val="accent1"/>
+          </a:fillRef>
+          <a:effectRef idx="3">
+            <a:schemeClr val="accent1"/>
+          </a:effectRef>
+          <a:fontRef idx="minor">
+            <a:schemeClr val="lt1"/>
+          </a:fontRef>
+        </p:style>
+        <p:txBody>
+          <a:bodyPr rtlCol="0" anchor="ctr"/>
+          <a:lstStyle/>
+          <a:p>
+            <a:pPr algn="ctr"/>
+            <a:r>
+              <a:rPr lang="en-US" sz="2000" b="1" dirty="0" smtClean="0"/>
+              <a:t>10</a:t>
+            </a:r>
+            <a:endParaRPr lang="en-US" sz="2000" b="1" dirty="0"/>
+          </a:p>
+        </p:txBody>
+      </p:sp>
+    </p:spTree>
+    <p:extLst>
+      <p:ext uri="{BB962C8B-B14F-4D97-AF65-F5344CB8AC3E}">
+        <p14:creationId xmlns:p14="http://schemas.microsoft.com/office/powerpoint/2010/main" val="3429110719"/>
+      </p:ext>
+    </p:extLst>
+  </p:cSld>
+  <p:clrMapOvr>
+    <a:masterClrMapping/>
+  </p:clrMapOvr>
+  <p:timing>
+    <p:tnLst>
+      <p:par>
+        <p:cTn id="1" dur="indefinite" restart="never" nodeType="tmRoot"/>
+      </p:par>
+    </p:tnLst>
+  </p:timing>
+</p:sld>
+</file>
+
+<file path=ppt/slides/slide11.xml><?xml version="1.0" encoding="utf-8"?>
+<p:sld xmlns:a="http://schemas.openxmlformats.org/drawingml/2006/main" xmlns:r="http://schemas.openxmlformats.org/officeDocument/2006/relationships" xmlns:p="http://schemas.openxmlformats.org/presentationml/2006/main">
+  <p:cSld>
+    <p:spTree>
+      <p:nvGrpSpPr>
+        <p:cNvPr id="1" name=""/>
+        <p:cNvGrpSpPr/>
+        <p:nvPr/>
+      </p:nvGrpSpPr>
+      <p:grpSpPr>
+        <a:xfrm>
+          <a:off x="0" y="0"/>
+          <a:ext cx="0" cy="0"/>
+          <a:chOff x="0" y="0"/>
+          <a:chExt cx="0" cy="0"/>
+        </a:xfrm>
+      </p:grpSpPr>
+      <p:sp>
+        <p:nvSpPr>
+          <p:cNvPr id="2" name="Title 1"/>
+          <p:cNvSpPr>
+            <a:spLocks noGrp="1"/>
+          </p:cNvSpPr>
+          <p:nvPr>
+            <p:ph type="title"/>
+          </p:nvPr>
+        </p:nvSpPr>
+        <p:spPr/>
+        <p:txBody>
+          <a:bodyPr/>
+          <a:lstStyle/>
+          <a:p>
+            <a:r>
               <a:rPr lang="en-US" sz="3200" b="1" dirty="0" smtClean="0"/>
-              <a:t>Detail solution</a:t>
+              <a:t>Find path</a:t>
             </a:r>
             <a:endParaRPr lang="en-US" sz="3200" b="1" dirty="0"/>
           </a:p>
@@ -15153,7 +15443,7 @@
             </a:r>
             <a:r>
               <a:rPr lang="en-US" sz="2600" b="0" dirty="0" smtClean="0"/>
-              <a:t> of stations. Condition: </a:t>
+              <a:t> of stations. </a:t>
             </a:r>
             <a:endParaRPr lang="en-US" sz="2600" b="0" dirty="0"/>
           </a:p>
@@ -15360,73 +15650,6 @@
           </a:p>
         </p:txBody>
       </p:sp>
-      <p:graphicFrame>
-        <p:nvGraphicFramePr>
-          <p:cNvPr id="6" name="Object 5"/>
-          <p:cNvGraphicFramePr>
-            <a:graphicFrameLocks noChangeAspect="1"/>
-          </p:cNvGraphicFramePr>
-          <p:nvPr>
-            <p:extLst>
-              <p:ext uri="{D42A27DB-BD31-4B8C-83A1-F6EECF244321}">
-                <p14:modId xmlns:p14="http://schemas.microsoft.com/office/powerpoint/2010/main" val="1224526688"/>
-              </p:ext>
-            </p:extLst>
-          </p:nvPr>
-        </p:nvGraphicFramePr>
-        <p:xfrm>
-          <a:off x="2971800" y="4267200"/>
-          <a:ext cx="2320636" cy="740203"/>
-        </p:xfrm>
-        <a:graphic>
-          <a:graphicData uri="http://schemas.openxmlformats.org/presentationml/2006/ole">
-            <mc:AlternateContent xmlns:mc="http://schemas.openxmlformats.org/markup-compatibility/2006">
-              <mc:Choice xmlns:v="urn:schemas-microsoft-com:vml" Requires="v">
-                <p:oleObj spid="_x0000_s4263" name="Equation" r:id="rId3" imgW="1104421" imgH="355446" progId="Equation.DSMT4">
-                  <p:embed/>
-                </p:oleObj>
-              </mc:Choice>
-              <mc:Fallback>
-                <p:oleObj name="Equation" r:id="rId3" imgW="1104421" imgH="355446" progId="Equation.DSMT4">
-                  <p:embed/>
-                  <p:pic>
-                    <p:nvPicPr>
-                      <p:cNvPr id="0" name=""/>
-                      <p:cNvPicPr>
-                        <a:picLocks noChangeAspect="1" noChangeArrowheads="1"/>
-                      </p:cNvPicPr>
-                      <p:nvPr/>
-                    </p:nvPicPr>
-                    <p:blipFill>
-                      <a:blip r:embed="rId4">
-                        <a:extLst>
-                          <a:ext uri="{28A0092B-C50C-407E-A947-70E740481C1C}">
-                            <a14:useLocalDpi xmlns:a14="http://schemas.microsoft.com/office/drawing/2010/main" val="0"/>
-                          </a:ext>
-                        </a:extLst>
-                      </a:blip>
-                      <a:srcRect/>
-                      <a:stretch>
-                        <a:fillRect/>
-                      </a:stretch>
-                    </p:blipFill>
-                    <p:spPr bwMode="auto">
-                      <a:xfrm>
-                        <a:off x="2971800" y="4267200"/>
-                        <a:ext cx="2320636" cy="740203"/>
-                      </a:xfrm>
-                      <a:prstGeom prst="rect">
-                        <a:avLst/>
-                      </a:prstGeom>
-                      <a:noFill/>
-                    </p:spPr>
-                  </p:pic>
-                </p:oleObj>
-              </mc:Fallback>
-            </mc:AlternateContent>
-          </a:graphicData>
-        </a:graphic>
-      </p:graphicFrame>
       <p:pic>
         <p:nvPicPr>
           <p:cNvPr id="4201" name="Picture 105" descr="C:\Users\Le Phuc Lu\Desktop\Capture.PNG"/>
@@ -15436,7 +15659,7 @@
           <p:nvPr/>
         </p:nvPicPr>
         <p:blipFill>
-          <a:blip r:embed="rId5">
+          <a:blip r:embed="rId2">
             <a:extLst>
               <a:ext uri="{28A0092B-C50C-407E-A947-70E740481C1C}">
                 <a14:useLocalDpi xmlns:a14="http://schemas.microsoft.com/office/drawing/2010/main" val="0"/>
@@ -15477,7 +15700,7 @@
           <p:nvPr/>
         </p:nvPicPr>
         <p:blipFill>
-          <a:blip r:embed="rId6">
+          <a:blip r:embed="rId3">
             <a:extLst>
               <a:ext uri="{28A0092B-C50C-407E-A947-70E740481C1C}">
                 <a14:useLocalDpi xmlns:a14="http://schemas.microsoft.com/office/drawing/2010/main" val="0"/>
@@ -15673,298 +15896,6 @@
 </p:sld>
 </file>
 
-<file path=ppt/slides/slide11.xml><?xml version="1.0" encoding="utf-8"?>
-<p:sld xmlns:a="http://schemas.openxmlformats.org/drawingml/2006/main" xmlns:r="http://schemas.openxmlformats.org/officeDocument/2006/relationships" xmlns:p="http://schemas.openxmlformats.org/presentationml/2006/main">
-  <p:cSld>
-    <p:spTree>
-      <p:nvGrpSpPr>
-        <p:cNvPr id="1" name=""/>
-        <p:cNvGrpSpPr/>
-        <p:nvPr/>
-      </p:nvGrpSpPr>
-      <p:grpSpPr>
-        <a:xfrm>
-          <a:off x="0" y="0"/>
-          <a:ext cx="0" cy="0"/>
-          <a:chOff x="0" y="0"/>
-          <a:chExt cx="0" cy="0"/>
-        </a:xfrm>
-      </p:grpSpPr>
-      <p:sp>
-        <p:nvSpPr>
-          <p:cNvPr id="2" name="Title 1"/>
-          <p:cNvSpPr>
-            <a:spLocks noGrp="1"/>
-          </p:cNvSpPr>
-          <p:nvPr>
-            <p:ph type="title"/>
-          </p:nvPr>
-        </p:nvSpPr>
-        <p:spPr/>
-        <p:txBody>
-          <a:bodyPr/>
-          <a:lstStyle/>
-          <a:p>
-            <a:r>
-              <a:rPr lang="en-US" sz="3000" b="1" dirty="0" smtClean="0"/>
-              <a:t>Three main steps</a:t>
-            </a:r>
-            <a:endParaRPr lang="en-US" sz="3000" b="1" dirty="0"/>
-          </a:p>
-        </p:txBody>
-      </p:sp>
-      <p:sp>
-        <p:nvSpPr>
-          <p:cNvPr id="3" name="Content Placeholder 2"/>
-          <p:cNvSpPr>
-            <a:spLocks noGrp="1"/>
-          </p:cNvSpPr>
-          <p:nvPr>
-            <p:ph idx="1"/>
-          </p:nvPr>
-        </p:nvSpPr>
-        <p:spPr>
-          <a:xfrm>
-            <a:off x="228600" y="1600200"/>
-            <a:ext cx="8763000" cy="3940175"/>
-          </a:xfrm>
-        </p:spPr>
-        <p:txBody>
-          <a:bodyPr/>
-          <a:lstStyle/>
-          <a:p>
-            <a:pPr algn="just">
-              <a:buFont typeface="Courier New" pitchFamily="49" charset="0"/>
-              <a:buChar char="o"/>
-            </a:pPr>
-            <a:r>
-              <a:rPr lang="en-US" sz="2700" dirty="0" smtClean="0"/>
-              <a:t>Step 1</a:t>
-            </a:r>
-            <a:r>
-              <a:rPr lang="en-US" sz="2700" b="0" dirty="0" smtClean="0"/>
-              <a:t>: check if request can be delivered on </a:t>
-            </a:r>
-            <a:r>
-              <a:rPr lang="en-US" sz="2700" dirty="0" smtClean="0"/>
-              <a:t>one trip </a:t>
-            </a:r>
-            <a:r>
-              <a:rPr lang="en-US" sz="2700" b="0" dirty="0" smtClean="0"/>
-              <a:t>starts at A and end at B.</a:t>
-            </a:r>
-          </a:p>
-          <a:p>
-            <a:pPr algn="just">
-              <a:buFont typeface="Courier New" pitchFamily="49" charset="0"/>
-              <a:buChar char="o"/>
-            </a:pPr>
-            <a:r>
-              <a:rPr lang="en-US" sz="2700" dirty="0" smtClean="0"/>
-              <a:t>Step 2</a:t>
-            </a:r>
-            <a:r>
-              <a:rPr lang="en-US" sz="2700" b="0" dirty="0" smtClean="0"/>
-              <a:t>: </a:t>
-            </a:r>
-            <a:r>
-              <a:rPr lang="en-US" sz="2700" b="0" dirty="0"/>
-              <a:t>check if request </a:t>
-            </a:r>
-            <a:r>
-              <a:rPr lang="en-US" sz="2700" b="0" dirty="0" smtClean="0"/>
-              <a:t>can be delivered by </a:t>
-            </a:r>
-            <a:r>
-              <a:rPr lang="en-US" sz="2700" dirty="0" smtClean="0"/>
-              <a:t>multiple trips </a:t>
-            </a:r>
-            <a:r>
-              <a:rPr lang="en-US" sz="2700" b="0" dirty="0" smtClean="0"/>
-              <a:t>that starts/ends at stations of the found way.</a:t>
-            </a:r>
-          </a:p>
-          <a:p>
-            <a:pPr algn="just">
-              <a:buFont typeface="Courier New" pitchFamily="49" charset="0"/>
-              <a:buChar char="o"/>
-            </a:pPr>
-            <a:r>
-              <a:rPr lang="en-US" sz="2700" dirty="0" smtClean="0"/>
-              <a:t>Step 3</a:t>
-            </a:r>
-            <a:r>
-              <a:rPr lang="en-US" sz="2700" b="0" dirty="0" smtClean="0"/>
-              <a:t>: </a:t>
-            </a:r>
-            <a:r>
-              <a:rPr lang="en-US" sz="2700" b="0" dirty="0"/>
-              <a:t>check if request can be delivered by </a:t>
-            </a:r>
-            <a:r>
-              <a:rPr lang="en-US" sz="2700" dirty="0" smtClean="0"/>
-              <a:t>multiple trips</a:t>
-            </a:r>
-            <a:r>
-              <a:rPr lang="en-US" sz="2700" b="0" dirty="0" smtClean="0"/>
-              <a:t> and its may be </a:t>
-            </a:r>
-            <a:r>
-              <a:rPr lang="en-US" sz="2700" dirty="0" smtClean="0"/>
-              <a:t>transferred at middle of way</a:t>
-            </a:r>
-            <a:r>
-              <a:rPr lang="en-US" sz="2700" b="0" dirty="0" smtClean="0"/>
-              <a:t>.</a:t>
-            </a:r>
-            <a:endParaRPr lang="en-US" sz="2700" b="0" dirty="0"/>
-          </a:p>
-        </p:txBody>
-      </p:sp>
-      <p:pic>
-        <p:nvPicPr>
-          <p:cNvPr id="12290" name="Picture 2" descr="C:\Users\Le Phuc Lu\Desktop\Capture.PNG"/>
-          <p:cNvPicPr>
-            <a:picLocks noChangeAspect="1" noChangeArrowheads="1"/>
-          </p:cNvPicPr>
-          <p:nvPr/>
-        </p:nvPicPr>
-        <p:blipFill>
-          <a:blip r:embed="rId2">
-            <a:extLst>
-              <a:ext uri="{28A0092B-C50C-407E-A947-70E740481C1C}">
-                <a14:useLocalDpi xmlns:a14="http://schemas.microsoft.com/office/drawing/2010/main" val="0"/>
-              </a:ext>
-            </a:extLst>
-          </a:blip>
-          <a:srcRect/>
-          <a:stretch>
-            <a:fillRect/>
-          </a:stretch>
-        </p:blipFill>
-        <p:spPr bwMode="auto">
-          <a:xfrm>
-            <a:off x="7086600" y="6616906"/>
-            <a:ext cx="1676400" cy="238125"/>
-          </a:xfrm>
-          <a:prstGeom prst="rect">
-            <a:avLst/>
-          </a:prstGeom>
-          <a:noFill/>
-          <a:extLst>
-            <a:ext uri="{909E8E84-426E-40DD-AFC4-6F175D3DCCD1}">
-              <a14:hiddenFill xmlns:a14="http://schemas.microsoft.com/office/drawing/2010/main">
-                <a:solidFill>
-                  <a:srgbClr val="FFFFFF"/>
-                </a:solidFill>
-              </a14:hiddenFill>
-            </a:ext>
-          </a:extLst>
-        </p:spPr>
-      </p:pic>
-      <p:pic>
-        <p:nvPicPr>
-          <p:cNvPr id="5" name="Picture 3" descr="C:\Users\Le Phuc Lu\Desktop\1.PNG"/>
-          <p:cNvPicPr>
-            <a:picLocks noChangeAspect="1" noChangeArrowheads="1"/>
-          </p:cNvPicPr>
-          <p:nvPr/>
-        </p:nvPicPr>
-        <p:blipFill>
-          <a:blip r:embed="rId3">
-            <a:extLst>
-              <a:ext uri="{28A0092B-C50C-407E-A947-70E740481C1C}">
-                <a14:useLocalDpi xmlns:a14="http://schemas.microsoft.com/office/drawing/2010/main" val="0"/>
-              </a:ext>
-            </a:extLst>
-          </a:blip>
-          <a:srcRect/>
-          <a:stretch>
-            <a:fillRect/>
-          </a:stretch>
-        </p:blipFill>
-        <p:spPr bwMode="auto">
-          <a:xfrm>
-            <a:off x="6858000" y="0"/>
-            <a:ext cx="1828800" cy="217410"/>
-          </a:xfrm>
-          <a:prstGeom prst="rect">
-            <a:avLst/>
-          </a:prstGeom>
-          <a:noFill/>
-          <a:extLst>
-            <a:ext uri="{909E8E84-426E-40DD-AFC4-6F175D3DCCD1}">
-              <a14:hiddenFill xmlns:a14="http://schemas.microsoft.com/office/drawing/2010/main">
-                <a:solidFill>
-                  <a:srgbClr val="FFFFFF"/>
-                </a:solidFill>
-              </a14:hiddenFill>
-            </a:ext>
-          </a:extLst>
-        </p:spPr>
-      </p:pic>
-      <p:sp>
-        <p:nvSpPr>
-          <p:cNvPr id="6" name="Oval 5"/>
-          <p:cNvSpPr/>
-          <p:nvPr/>
-        </p:nvSpPr>
-        <p:spPr>
-          <a:xfrm>
-            <a:off x="8077200" y="6324600"/>
-            <a:ext cx="990600" cy="457200"/>
-          </a:xfrm>
-          <a:prstGeom prst="ellipse">
-            <a:avLst/>
-          </a:prstGeom>
-        </p:spPr>
-        <p:style>
-          <a:lnRef idx="0">
-            <a:schemeClr val="accent1"/>
-          </a:lnRef>
-          <a:fillRef idx="3">
-            <a:schemeClr val="accent1"/>
-          </a:fillRef>
-          <a:effectRef idx="3">
-            <a:schemeClr val="accent1"/>
-          </a:effectRef>
-          <a:fontRef idx="minor">
-            <a:schemeClr val="lt1"/>
-          </a:fontRef>
-        </p:style>
-        <p:txBody>
-          <a:bodyPr rtlCol="0" anchor="ctr"/>
-          <a:lstStyle/>
-          <a:p>
-            <a:pPr algn="ctr"/>
-            <a:r>
-              <a:rPr lang="en-US" sz="2000" b="1" dirty="0" smtClean="0"/>
-              <a:t>10</a:t>
-            </a:r>
-            <a:endParaRPr lang="en-US" sz="2000" b="1" dirty="0"/>
-          </a:p>
-        </p:txBody>
-      </p:sp>
-    </p:spTree>
-    <p:extLst>
-      <p:ext uri="{BB962C8B-B14F-4D97-AF65-F5344CB8AC3E}">
-        <p14:creationId xmlns:p14="http://schemas.microsoft.com/office/powerpoint/2010/main" val="3429110719"/>
-      </p:ext>
-    </p:extLst>
-  </p:cSld>
-  <p:clrMapOvr>
-    <a:masterClrMapping/>
-  </p:clrMapOvr>
-  <p:timing>
-    <p:tnLst>
-      <p:par>
-        <p:cTn id="1" dur="indefinite" restart="never" nodeType="tmRoot"/>
-      </p:par>
-    </p:tnLst>
-  </p:timing>
-</p:sld>
-</file>
-
 <file path=ppt/slides/slide12.xml><?xml version="1.0" encoding="utf-8"?>
 <p:sld xmlns:a="http://schemas.openxmlformats.org/drawingml/2006/main" xmlns:r="http://schemas.openxmlformats.org/officeDocument/2006/relationships" xmlns:p="http://schemas.openxmlformats.org/presentationml/2006/main">
   <p:cSld>
@@ -16030,8 +15961,13 @@
             </a:pPr>
             <a:r>
               <a:rPr lang="en-US" sz="2700" b="0" dirty="0" smtClean="0"/>
-              <a:t>Using heuristic idea, try to find:</a:t>
-            </a:r>
+              <a:t>Using heuristic idea, try to </a:t>
+            </a:r>
+            <a:r>
+              <a:rPr lang="en-US" sz="2700" b="0" dirty="0" smtClean="0"/>
+              <a:t>find:</a:t>
+            </a:r>
+            <a:endParaRPr lang="en-US" sz="2700" b="0" dirty="0" smtClean="0"/>
           </a:p>
           <a:p>
             <a:pPr>
@@ -17554,7 +17490,7 @@
           <a:p>
             <a:r>
               <a:rPr lang="en-US" sz="3200" b="1" dirty="0" smtClean="0"/>
-              <a:t>Choose the best solution</a:t>
+              <a:t>Self evaluation</a:t>
             </a:r>
             <a:endParaRPr lang="en-US" sz="3200" b="1" dirty="0"/>
           </a:p>
@@ -17570,278 +17506,12 @@
             <p:ph idx="1"/>
           </p:nvPr>
         </p:nvSpPr>
-        <p:spPr/>
-        <p:txBody>
-          <a:bodyPr/>
-          <a:lstStyle/>
-          <a:p>
-            <a:pPr marL="0" indent="0">
-              <a:buNone/>
-            </a:pPr>
-            <a:r>
-              <a:rPr lang="en-US" sz="3000" b="0" dirty="0" smtClean="0"/>
-              <a:t>For list of found solutions, sort them base on </a:t>
-            </a:r>
-            <a:r>
-              <a:rPr lang="en-US" sz="3000" i="1" dirty="0" smtClean="0"/>
-              <a:t>some criterions</a:t>
-            </a:r>
-            <a:r>
-              <a:rPr lang="en-US" sz="3000" b="0" dirty="0" smtClean="0"/>
-              <a:t>:</a:t>
-            </a:r>
-          </a:p>
-          <a:p>
-            <a:pPr>
-              <a:buFontTx/>
-              <a:buChar char="-"/>
-            </a:pPr>
-            <a:r>
-              <a:rPr lang="en-US" sz="3000" i="1" dirty="0" smtClean="0"/>
-              <a:t>The</a:t>
-            </a:r>
-            <a:r>
-              <a:rPr lang="en-US" sz="3000" b="0" dirty="0" smtClean="0"/>
-              <a:t> </a:t>
-            </a:r>
-            <a:r>
-              <a:rPr lang="en-US" sz="3000" i="1" dirty="0" smtClean="0"/>
-              <a:t>arrival time of last trip</a:t>
-            </a:r>
-            <a:r>
-              <a:rPr lang="en-US" sz="3000" b="0" dirty="0" smtClean="0"/>
-              <a:t>.</a:t>
-            </a:r>
-          </a:p>
-          <a:p>
-            <a:pPr>
-              <a:buFontTx/>
-              <a:buChar char="-"/>
-            </a:pPr>
-            <a:r>
-              <a:rPr lang="en-US" sz="3000" i="1" dirty="0" smtClean="0"/>
-              <a:t>The</a:t>
-            </a:r>
-            <a:r>
-              <a:rPr lang="en-US" sz="3000" b="0" dirty="0" smtClean="0"/>
-              <a:t> </a:t>
-            </a:r>
-            <a:r>
-              <a:rPr lang="en-US" sz="3000" i="1" dirty="0" smtClean="0"/>
-              <a:t>number of used trips</a:t>
-            </a:r>
-            <a:r>
-              <a:rPr lang="en-US" sz="3000" b="0" dirty="0" smtClean="0"/>
-              <a:t>.</a:t>
-            </a:r>
-            <a:endParaRPr lang="en-US" sz="3000" b="0" dirty="0"/>
-          </a:p>
-          <a:p>
-            <a:pPr marL="0" indent="0">
-              <a:buNone/>
-            </a:pPr>
-            <a:r>
-              <a:rPr lang="en-US" sz="3000" b="0" dirty="0" smtClean="0"/>
-              <a:t>Then choose the first solution of list with best fit all constraints.</a:t>
-            </a:r>
-          </a:p>
-        </p:txBody>
-      </p:sp>
-      <p:pic>
-        <p:nvPicPr>
-          <p:cNvPr id="14338" name="Picture 2" descr="C:\Users\Le Phuc Lu\Desktop\Capture.PNG"/>
-          <p:cNvPicPr>
-            <a:picLocks noChangeAspect="1" noChangeArrowheads="1"/>
-          </p:cNvPicPr>
-          <p:nvPr/>
-        </p:nvPicPr>
-        <p:blipFill>
-          <a:blip r:embed="rId2">
-            <a:extLst>
-              <a:ext uri="{28A0092B-C50C-407E-A947-70E740481C1C}">
-                <a14:useLocalDpi xmlns:a14="http://schemas.microsoft.com/office/drawing/2010/main" val="0"/>
-              </a:ext>
-            </a:extLst>
-          </a:blip>
-          <a:srcRect/>
-          <a:stretch>
-            <a:fillRect/>
-          </a:stretch>
-        </p:blipFill>
-        <p:spPr bwMode="auto">
-          <a:xfrm>
-            <a:off x="7010400" y="6619875"/>
-            <a:ext cx="1676400" cy="238125"/>
-          </a:xfrm>
-          <a:prstGeom prst="rect">
-            <a:avLst/>
-          </a:prstGeom>
-          <a:noFill/>
-          <a:extLst>
-            <a:ext uri="{909E8E84-426E-40DD-AFC4-6F175D3DCCD1}">
-              <a14:hiddenFill xmlns:a14="http://schemas.microsoft.com/office/drawing/2010/main">
-                <a:solidFill>
-                  <a:srgbClr val="FFFFFF"/>
-                </a:solidFill>
-              </a14:hiddenFill>
-            </a:ext>
-          </a:extLst>
-        </p:spPr>
-      </p:pic>
-      <p:pic>
-        <p:nvPicPr>
-          <p:cNvPr id="5" name="Picture 3" descr="C:\Users\Le Phuc Lu\Desktop\1.PNG"/>
-          <p:cNvPicPr>
-            <a:picLocks noChangeAspect="1" noChangeArrowheads="1"/>
-          </p:cNvPicPr>
-          <p:nvPr/>
-        </p:nvPicPr>
-        <p:blipFill>
-          <a:blip r:embed="rId3">
-            <a:extLst>
-              <a:ext uri="{28A0092B-C50C-407E-A947-70E740481C1C}">
-                <a14:useLocalDpi xmlns:a14="http://schemas.microsoft.com/office/drawing/2010/main" val="0"/>
-              </a:ext>
-            </a:extLst>
-          </a:blip>
-          <a:srcRect/>
-          <a:stretch>
-            <a:fillRect/>
-          </a:stretch>
-        </p:blipFill>
-        <p:spPr bwMode="auto">
-          <a:xfrm>
-            <a:off x="6858000" y="0"/>
-            <a:ext cx="1828800" cy="217410"/>
-          </a:xfrm>
-          <a:prstGeom prst="rect">
-            <a:avLst/>
-          </a:prstGeom>
-          <a:noFill/>
-          <a:extLst>
-            <a:ext uri="{909E8E84-426E-40DD-AFC4-6F175D3DCCD1}">
-              <a14:hiddenFill xmlns:a14="http://schemas.microsoft.com/office/drawing/2010/main">
-                <a:solidFill>
-                  <a:srgbClr val="FFFFFF"/>
-                </a:solidFill>
-              </a14:hiddenFill>
-            </a:ext>
-          </a:extLst>
-        </p:spPr>
-      </p:pic>
-      <p:sp>
-        <p:nvSpPr>
-          <p:cNvPr id="6" name="Oval 5"/>
-          <p:cNvSpPr/>
-          <p:nvPr/>
-        </p:nvSpPr>
         <p:spPr>
           <a:xfrm>
-            <a:off x="8077200" y="6324600"/>
-            <a:ext cx="990600" cy="457200"/>
+            <a:off x="228600" y="1393825"/>
+            <a:ext cx="8686800" cy="4930775"/>
           </a:xfrm>
-          <a:prstGeom prst="ellipse">
-            <a:avLst/>
-          </a:prstGeom>
         </p:spPr>
-        <p:style>
-          <a:lnRef idx="0">
-            <a:schemeClr val="accent1"/>
-          </a:lnRef>
-          <a:fillRef idx="3">
-            <a:schemeClr val="accent1"/>
-          </a:fillRef>
-          <a:effectRef idx="3">
-            <a:schemeClr val="accent1"/>
-          </a:effectRef>
-          <a:fontRef idx="minor">
-            <a:schemeClr val="lt1"/>
-          </a:fontRef>
-        </p:style>
-        <p:txBody>
-          <a:bodyPr rtlCol="0" anchor="ctr"/>
-          <a:lstStyle/>
-          <a:p>
-            <a:pPr algn="ctr"/>
-            <a:r>
-              <a:rPr lang="en-US" sz="2000" b="1" dirty="0" smtClean="0"/>
-              <a:t>12</a:t>
-            </a:r>
-            <a:endParaRPr lang="en-US" sz="2000" b="1" dirty="0"/>
-          </a:p>
-        </p:txBody>
-      </p:sp>
-    </p:spTree>
-    <p:extLst>
-      <p:ext uri="{BB962C8B-B14F-4D97-AF65-F5344CB8AC3E}">
-        <p14:creationId xmlns:p14="http://schemas.microsoft.com/office/powerpoint/2010/main" val="2144043899"/>
-      </p:ext>
-    </p:extLst>
-  </p:cSld>
-  <p:clrMapOvr>
-    <a:masterClrMapping/>
-  </p:clrMapOvr>
-  <p:timing>
-    <p:tnLst>
-      <p:par>
-        <p:cTn id="1" dur="indefinite" restart="never" nodeType="tmRoot"/>
-      </p:par>
-    </p:tnLst>
-  </p:timing>
-</p:sld>
-</file>
-
-<file path=ppt/slides/slide14.xml><?xml version="1.0" encoding="utf-8"?>
-<p:sld xmlns:a="http://schemas.openxmlformats.org/drawingml/2006/main" xmlns:r="http://schemas.openxmlformats.org/officeDocument/2006/relationships" xmlns:p="http://schemas.openxmlformats.org/presentationml/2006/main">
-  <p:cSld>
-    <p:spTree>
-      <p:nvGrpSpPr>
-        <p:cNvPr id="1" name=""/>
-        <p:cNvGrpSpPr/>
-        <p:nvPr/>
-      </p:nvGrpSpPr>
-      <p:grpSpPr>
-        <a:xfrm>
-          <a:off x="0" y="0"/>
-          <a:ext cx="0" cy="0"/>
-          <a:chOff x="0" y="0"/>
-          <a:chExt cx="0" cy="0"/>
-        </a:xfrm>
-      </p:grpSpPr>
-      <p:sp>
-        <p:nvSpPr>
-          <p:cNvPr id="2" name="Title 1"/>
-          <p:cNvSpPr>
-            <a:spLocks noGrp="1"/>
-          </p:cNvSpPr>
-          <p:nvPr>
-            <p:ph type="title"/>
-          </p:nvPr>
-        </p:nvSpPr>
-        <p:spPr/>
-        <p:txBody>
-          <a:bodyPr/>
-          <a:lstStyle/>
-          <a:p>
-            <a:r>
-              <a:rPr lang="en-US" sz="3200" b="1" dirty="0" smtClean="0"/>
-              <a:t>Positive of algorithm</a:t>
-            </a:r>
-            <a:endParaRPr lang="en-US" sz="3200" b="1" dirty="0"/>
-          </a:p>
-        </p:txBody>
-      </p:sp>
-      <p:sp>
-        <p:nvSpPr>
-          <p:cNvPr id="3" name="Content Placeholder 2"/>
-          <p:cNvSpPr>
-            <a:spLocks noGrp="1"/>
-          </p:cNvSpPr>
-          <p:nvPr>
-            <p:ph idx="1"/>
-          </p:nvPr>
-        </p:nvSpPr>
-        <p:spPr/>
         <p:txBody>
           <a:bodyPr/>
           <a:lstStyle/>
@@ -17849,56 +17519,19 @@
             <a:pPr algn="just"/>
             <a:r>
               <a:rPr lang="en-US" sz="2600" b="0" dirty="0" smtClean="0"/>
-              <a:t>Use </a:t>
-            </a:r>
-            <a:r>
-              <a:rPr lang="en-US" sz="2600" i="1" dirty="0" smtClean="0"/>
-              <a:t>greedy thinking </a:t>
-            </a:r>
-            <a:r>
-              <a:rPr lang="en-US" sz="2600" b="0" dirty="0" smtClean="0"/>
-              <a:t>so fast to find out </a:t>
-            </a:r>
-            <a:r>
-              <a:rPr lang="en-US" sz="2600" i="1" dirty="0" smtClean="0"/>
-              <a:t>local optimal </a:t>
-            </a:r>
-            <a:r>
-              <a:rPr lang="en-US" sz="2600" b="0" dirty="0" smtClean="0"/>
-              <a:t>solution of given problem.</a:t>
+              <a:t>Some positives.</a:t>
             </a:r>
           </a:p>
           <a:p>
-            <a:r>
-              <a:rPr lang="en-US" sz="2600" b="0" dirty="0"/>
-              <a:t> </a:t>
-            </a:r>
+            <a:pPr algn="just"/>
             <a:r>
               <a:rPr lang="en-US" sz="2600" b="0" dirty="0" smtClean="0"/>
-              <a:t>Some </a:t>
-            </a:r>
-            <a:r>
-              <a:rPr lang="en-US" sz="2600" i="1" dirty="0" smtClean="0"/>
-              <a:t>list data </a:t>
-            </a:r>
-            <a:r>
-              <a:rPr lang="en-US" sz="2600" b="0" dirty="0" smtClean="0"/>
-              <a:t>use for the one request is </a:t>
-            </a:r>
-            <a:r>
-              <a:rPr lang="en-US" sz="2600" i="1" dirty="0" smtClean="0"/>
-              <a:t>used for all next request</a:t>
-            </a:r>
-            <a:r>
-              <a:rPr lang="en-US" sz="2600" b="0" dirty="0" smtClean="0"/>
-              <a:t>.</a:t>
-            </a:r>
+              <a:t>Some negatives.</a:t>
+            </a:r>
+            <a:endParaRPr lang="en-US" sz="2600" b="0" dirty="0" smtClean="0"/>
           </a:p>
           <a:p>
-            <a:r>
-              <a:rPr lang="en-US" sz="2600" b="0" dirty="0"/>
-              <a:t> </a:t>
-            </a:r>
+            <a:pPr algn="just"/>
             <a:r>
               <a:rPr lang="en-US" sz="2600" b="0" dirty="0" smtClean="0"/>
               <a:t>Estimate </a:t>
@@ -17922,20 +17555,32 @@
               <a:t>O((</a:t>
             </a:r>
             <a:r>
-              <a:rPr lang="en-US" sz="2600" b="0" dirty="0" err="1" smtClean="0"/>
-              <a:t>k|V</a:t>
-            </a:r>
-            <a:r>
               <a:rPr lang="en-US" sz="2600" b="0" dirty="0" smtClean="0"/>
-              <a:t>||E|</a:t>
-            </a:r>
-            <a:r>
-              <a:rPr lang="en-US" sz="2600" b="0" baseline="30000" dirty="0" smtClean="0"/>
-              <a:t>2</a:t>
+              <a:t>k(|</a:t>
             </a:r>
             <a:r>
               <a:rPr lang="en-US" sz="2600" b="0" dirty="0" smtClean="0"/>
-              <a:t> + |E|</a:t>
+              <a:t>V</a:t>
+            </a:r>
+            <a:r>
+              <a:rPr lang="en-US" sz="2600" b="0" dirty="0" smtClean="0"/>
+              <a:t>|+|S</a:t>
+            </a:r>
+            <a:r>
+              <a:rPr lang="en-US" sz="2600" b="0" dirty="0" smtClean="0"/>
+              <a:t>|)</a:t>
+            </a:r>
+            <a:r>
+              <a:rPr lang="en-US" sz="2600" b="0" dirty="0" smtClean="0"/>
+              <a:t> </a:t>
+            </a:r>
+            <a:r>
+              <a:rPr lang="en-US" sz="2600" b="0" dirty="0" smtClean="0"/>
+              <a:t>+ </a:t>
+            </a:r>
+            <a:r>
+              <a:rPr lang="en-US" sz="2600" b="0" dirty="0" smtClean="0"/>
+              <a:t>|E|</a:t>
             </a:r>
             <a:r>
               <a:rPr lang="en-US" sz="2600" b="0" baseline="30000" dirty="0" smtClean="0"/>
@@ -17943,7 +17588,11 @@
             </a:r>
             <a:r>
               <a:rPr lang="en-US" sz="2600" b="0" dirty="0" smtClean="0"/>
-              <a:t>) x |T| x |R| x |S| x |I|).</a:t>
+              <a:t>).|T|.|R|.|S|.|</a:t>
+            </a:r>
+            <a:r>
+              <a:rPr lang="en-US" sz="2600" b="0" dirty="0" smtClean="0"/>
+              <a:t>I|).</a:t>
             </a:r>
           </a:p>
           <a:p>
@@ -17952,11 +17601,62 @@
             </a:pPr>
             <a:r>
               <a:rPr lang="en-US" sz="2600" b="0" dirty="0" smtClean="0"/>
-              <a:t>with |T|, |R|, |S|, |I| are number of trips, routes, stages and requests.</a:t>
+              <a:t>with |T|, |R|, |S|, |I</a:t>
+            </a:r>
+            <a:r>
+              <a:rPr lang="en-US" sz="2600" b="0" dirty="0" smtClean="0"/>
+              <a:t>|, |E| </a:t>
+            </a:r>
+            <a:r>
+              <a:rPr lang="en-US" sz="2600" b="0" dirty="0" smtClean="0"/>
+              <a:t>are number of trips, routes, </a:t>
+            </a:r>
+            <a:r>
+              <a:rPr lang="en-US" sz="2600" b="0" dirty="0" smtClean="0"/>
+              <a:t>stages, requests and length of found path.</a:t>
             </a:r>
           </a:p>
           <a:p>
-            <a:endParaRPr lang="en-US" sz="2600" b="0" dirty="0"/>
+            <a:pPr marL="0" indent="0">
+              <a:buNone/>
+            </a:pPr>
+            <a:r>
+              <a:rPr lang="en-US" sz="2600" b="0" dirty="0" smtClean="0"/>
+              <a:t>With the </a:t>
+            </a:r>
+            <a:r>
+              <a:rPr lang="en-US" sz="2600" i="1" dirty="0" smtClean="0"/>
+              <a:t>normal data </a:t>
+            </a:r>
+            <a:r>
+              <a:rPr lang="en-US" sz="2600" b="0" dirty="0" smtClean="0"/>
+              <a:t>(|T| ~ 400, |R| ~ 30, |S| ~ 30, |E|</a:t>
+            </a:r>
+            <a:r>
+              <a:rPr lang="en-US" sz="2600" b="0" baseline="30000" dirty="0" smtClean="0"/>
+              <a:t>4</a:t>
+            </a:r>
+            <a:r>
+              <a:rPr lang="en-US" sz="2600" b="0" dirty="0" smtClean="0"/>
+              <a:t> ~ 500), the complexity is O(2.10</a:t>
+            </a:r>
+            <a:r>
+              <a:rPr lang="en-US" sz="2600" b="0" baseline="30000" dirty="0" smtClean="0"/>
+              <a:t>8</a:t>
+            </a:r>
+            <a:r>
+              <a:rPr lang="en-US" sz="2600" b="0" dirty="0" smtClean="0"/>
+              <a:t>|I|). The </a:t>
+            </a:r>
+            <a:r>
+              <a:rPr lang="en-US" sz="2600" i="1" dirty="0" smtClean="0"/>
+              <a:t>time</a:t>
+            </a:r>
+            <a:r>
+              <a:rPr lang="en-US" sz="2600" b="0" dirty="0" smtClean="0"/>
+              <a:t> need to run is 1-5s.</a:t>
+            </a:r>
+            <a:endParaRPr lang="en-US" sz="2600" b="0" dirty="0" smtClean="0"/>
           </a:p>
         </p:txBody>
       </p:sp>
@@ -18104,245 +17804,7 @@
 </p:sld>
 </file>
 
-<file path=ppt/slides/slide15.xml><?xml version="1.0" encoding="utf-8"?>
-<p:sld xmlns:a="http://schemas.openxmlformats.org/drawingml/2006/main" xmlns:r="http://schemas.openxmlformats.org/officeDocument/2006/relationships" xmlns:p="http://schemas.openxmlformats.org/presentationml/2006/main">
-  <p:cSld>
-    <p:spTree>
-      <p:nvGrpSpPr>
-        <p:cNvPr id="1" name=""/>
-        <p:cNvGrpSpPr/>
-        <p:nvPr/>
-      </p:nvGrpSpPr>
-      <p:grpSpPr>
-        <a:xfrm>
-          <a:off x="0" y="0"/>
-          <a:ext cx="0" cy="0"/>
-          <a:chOff x="0" y="0"/>
-          <a:chExt cx="0" cy="0"/>
-        </a:xfrm>
-      </p:grpSpPr>
-      <p:sp>
-        <p:nvSpPr>
-          <p:cNvPr id="2" name="Title 1"/>
-          <p:cNvSpPr>
-            <a:spLocks noGrp="1"/>
-          </p:cNvSpPr>
-          <p:nvPr>
-            <p:ph type="title"/>
-          </p:nvPr>
-        </p:nvSpPr>
-        <p:spPr/>
-        <p:txBody>
-          <a:bodyPr/>
-          <a:lstStyle/>
-          <a:p>
-            <a:r>
-              <a:rPr lang="en-US" sz="3200" b="1" dirty="0" smtClean="0"/>
-              <a:t>Negative of algorithm</a:t>
-            </a:r>
-            <a:endParaRPr lang="en-US" sz="3200" b="1" dirty="0"/>
-          </a:p>
-        </p:txBody>
-      </p:sp>
-      <p:sp>
-        <p:nvSpPr>
-          <p:cNvPr id="3" name="Content Placeholder 2"/>
-          <p:cNvSpPr>
-            <a:spLocks noGrp="1"/>
-          </p:cNvSpPr>
-          <p:nvPr>
-            <p:ph idx="1"/>
-          </p:nvPr>
-        </p:nvSpPr>
-        <p:spPr>
-          <a:xfrm>
-            <a:off x="457200" y="1393825"/>
-            <a:ext cx="8382000" cy="4930775"/>
-          </a:xfrm>
-        </p:spPr>
-        <p:txBody>
-          <a:bodyPr/>
-          <a:lstStyle/>
-          <a:p>
-            <a:r>
-              <a:rPr lang="en-US" sz="2700" dirty="0" smtClean="0"/>
-              <a:t> </a:t>
-            </a:r>
-            <a:r>
-              <a:rPr lang="en-US" sz="2700" b="0" dirty="0" smtClean="0"/>
-              <a:t>The steps of algorithm are </a:t>
-            </a:r>
-            <a:r>
-              <a:rPr lang="en-US" sz="2700" i="1" dirty="0" smtClean="0"/>
-              <a:t>separately performed</a:t>
-            </a:r>
-            <a:r>
-              <a:rPr lang="en-US" sz="2700" b="0" dirty="0" smtClean="0"/>
-              <a:t> so in some case, the solution exist but can not be found (tricky or special case).</a:t>
-            </a:r>
-          </a:p>
-          <a:p>
-            <a:r>
-              <a:rPr lang="en-US" sz="2700" b="0" dirty="0" smtClean="0"/>
-              <a:t>Some step of algorithm can be implemented better to reduce the complexity but </a:t>
-            </a:r>
-            <a:r>
-              <a:rPr lang="en-US" sz="2700" i="1" dirty="0" smtClean="0"/>
-              <a:t>still not have done</a:t>
-            </a:r>
-            <a:r>
-              <a:rPr lang="en-US" sz="2700" b="0" dirty="0"/>
-              <a:t>.</a:t>
-            </a:r>
-            <a:endParaRPr lang="en-US" sz="2700" b="0" dirty="0" smtClean="0"/>
-          </a:p>
-        </p:txBody>
-      </p:sp>
-      <p:pic>
-        <p:nvPicPr>
-          <p:cNvPr id="16386" name="Picture 2" descr="C:\Users\Le Phuc Lu\Desktop\Capture.PNG"/>
-          <p:cNvPicPr>
-            <a:picLocks noChangeAspect="1" noChangeArrowheads="1"/>
-          </p:cNvPicPr>
-          <p:nvPr/>
-        </p:nvPicPr>
-        <p:blipFill>
-          <a:blip r:embed="rId2">
-            <a:extLst>
-              <a:ext uri="{28A0092B-C50C-407E-A947-70E740481C1C}">
-                <a14:useLocalDpi xmlns:a14="http://schemas.microsoft.com/office/drawing/2010/main" val="0"/>
-              </a:ext>
-            </a:extLst>
-          </a:blip>
-          <a:srcRect/>
-          <a:stretch>
-            <a:fillRect/>
-          </a:stretch>
-        </p:blipFill>
-        <p:spPr bwMode="auto">
-          <a:xfrm>
-            <a:off x="7010400" y="6616906"/>
-            <a:ext cx="1676400" cy="238125"/>
-          </a:xfrm>
-          <a:prstGeom prst="rect">
-            <a:avLst/>
-          </a:prstGeom>
-          <a:noFill/>
-          <a:extLst>
-            <a:ext uri="{909E8E84-426E-40DD-AFC4-6F175D3DCCD1}">
-              <a14:hiddenFill xmlns:a14="http://schemas.microsoft.com/office/drawing/2010/main">
-                <a:solidFill>
-                  <a:srgbClr val="FFFFFF"/>
-                </a:solidFill>
-              </a14:hiddenFill>
-            </a:ext>
-          </a:extLst>
-        </p:spPr>
-      </p:pic>
-      <p:pic>
-        <p:nvPicPr>
-          <p:cNvPr id="5" name="Picture 3" descr="C:\Users\Le Phuc Lu\Desktop\1.PNG"/>
-          <p:cNvPicPr>
-            <a:picLocks noChangeAspect="1" noChangeArrowheads="1"/>
-          </p:cNvPicPr>
-          <p:nvPr/>
-        </p:nvPicPr>
-        <p:blipFill>
-          <a:blip r:embed="rId3">
-            <a:extLst>
-              <a:ext uri="{28A0092B-C50C-407E-A947-70E740481C1C}">
-                <a14:useLocalDpi xmlns:a14="http://schemas.microsoft.com/office/drawing/2010/main" val="0"/>
-              </a:ext>
-            </a:extLst>
-          </a:blip>
-          <a:srcRect/>
-          <a:stretch>
-            <a:fillRect/>
-          </a:stretch>
-        </p:blipFill>
-        <p:spPr bwMode="auto">
-          <a:xfrm>
-            <a:off x="6858000" y="0"/>
-            <a:ext cx="1828800" cy="217410"/>
-          </a:xfrm>
-          <a:prstGeom prst="rect">
-            <a:avLst/>
-          </a:prstGeom>
-          <a:noFill/>
-          <a:extLst>
-            <a:ext uri="{909E8E84-426E-40DD-AFC4-6F175D3DCCD1}">
-              <a14:hiddenFill xmlns:a14="http://schemas.microsoft.com/office/drawing/2010/main">
-                <a:solidFill>
-                  <a:srgbClr val="FFFFFF"/>
-                </a:solidFill>
-              </a14:hiddenFill>
-            </a:ext>
-          </a:extLst>
-        </p:spPr>
-      </p:pic>
-      <p:sp>
-        <p:nvSpPr>
-          <p:cNvPr id="6" name="Oval 5"/>
-          <p:cNvSpPr/>
-          <p:nvPr/>
-        </p:nvSpPr>
-        <p:spPr>
-          <a:xfrm>
-            <a:off x="8077200" y="6324600"/>
-            <a:ext cx="990600" cy="457200"/>
-          </a:xfrm>
-          <a:prstGeom prst="ellipse">
-            <a:avLst/>
-          </a:prstGeom>
-        </p:spPr>
-        <p:style>
-          <a:lnRef idx="0">
-            <a:schemeClr val="accent1"/>
-          </a:lnRef>
-          <a:fillRef idx="3">
-            <a:schemeClr val="accent1"/>
-          </a:fillRef>
-          <a:effectRef idx="3">
-            <a:schemeClr val="accent1"/>
-          </a:effectRef>
-          <a:fontRef idx="minor">
-            <a:schemeClr val="lt1"/>
-          </a:fontRef>
-        </p:style>
-        <p:txBody>
-          <a:bodyPr rtlCol="0" anchor="ctr"/>
-          <a:lstStyle/>
-          <a:p>
-            <a:pPr algn="ctr"/>
-            <a:r>
-              <a:rPr lang="en-US" sz="2000" b="1" dirty="0" smtClean="0"/>
-              <a:t>14</a:t>
-            </a:r>
-            <a:endParaRPr lang="en-US" sz="2000" b="1" dirty="0"/>
-          </a:p>
-        </p:txBody>
-      </p:sp>
-    </p:spTree>
-    <p:extLst>
-      <p:ext uri="{BB962C8B-B14F-4D97-AF65-F5344CB8AC3E}">
-        <p14:creationId xmlns:p14="http://schemas.microsoft.com/office/powerpoint/2010/main" val="1528650607"/>
-      </p:ext>
-    </p:extLst>
-  </p:cSld>
-  <p:clrMapOvr>
-    <a:masterClrMapping/>
-  </p:clrMapOvr>
-  <p:timing>
-    <p:tnLst>
-      <p:par>
-        <p:cTn id="1" dur="indefinite" restart="never" nodeType="tmRoot"/>
-      </p:par>
-    </p:tnLst>
-  </p:timing>
-</p:sld>
-</file>
-
-<file path=ppt/slides/slide16.xml><?xml version="1.0" encoding="utf-8"?>
+<file path=ppt/slides/slide14.xml><?xml version="1.0" encoding="utf-8"?>
 <p:sld xmlns:a="http://schemas.openxmlformats.org/drawingml/2006/main" xmlns:r="http://schemas.openxmlformats.org/officeDocument/2006/relationships" xmlns:p="http://schemas.openxmlformats.org/presentationml/2006/main">
   <p:cSld>
     <p:spTree>
@@ -18909,7 +18371,7 @@
 </p:sld>
 </file>
 
-<file path=ppt/slides/slide17.xml><?xml version="1.0" encoding="utf-8"?>
+<file path=ppt/slides/slide15.xml><?xml version="1.0" encoding="utf-8"?>
 <p:sld xmlns:a="http://schemas.openxmlformats.org/drawingml/2006/main" xmlns:r="http://schemas.openxmlformats.org/officeDocument/2006/relationships" xmlns:p="http://schemas.openxmlformats.org/presentationml/2006/main">
   <p:cSld>
     <p:spTree>
@@ -19252,7 +18714,7 @@
 </p:sld>
 </file>
 
-<file path=ppt/slides/slide18.xml><?xml version="1.0" encoding="utf-8"?>
+<file path=ppt/slides/slide16.xml><?xml version="1.0" encoding="utf-8"?>
 <p:sld xmlns:a="http://schemas.openxmlformats.org/drawingml/2006/main" xmlns:r="http://schemas.openxmlformats.org/officeDocument/2006/relationships" xmlns:p="http://schemas.openxmlformats.org/presentationml/2006/main">
   <p:cSld>
     <p:spTree>
@@ -19450,7 +18912,7 @@
 </p:sld>
 </file>
 
-<file path=ppt/slides/slide19.xml><?xml version="1.0" encoding="utf-8"?>
+<file path=ppt/slides/slide17.xml><?xml version="1.0" encoding="utf-8"?>
 <p:sld xmlns:a="http://schemas.openxmlformats.org/drawingml/2006/main" xmlns:r="http://schemas.openxmlformats.org/officeDocument/2006/relationships" xmlns:p="http://schemas.openxmlformats.org/presentationml/2006/main">
   <p:cSld>
     <p:spTree>
@@ -19781,6 +19243,236 @@
 </p:sld>
 </file>
 
+<file path=ppt/slides/slide18.xml><?xml version="1.0" encoding="utf-8"?>
+<p:sld xmlns:a="http://schemas.openxmlformats.org/drawingml/2006/main" xmlns:r="http://schemas.openxmlformats.org/officeDocument/2006/relationships" xmlns:p="http://schemas.openxmlformats.org/presentationml/2006/main">
+  <p:cSld>
+    <p:spTree>
+      <p:nvGrpSpPr>
+        <p:cNvPr id="1" name=""/>
+        <p:cNvGrpSpPr/>
+        <p:nvPr/>
+      </p:nvGrpSpPr>
+      <p:grpSpPr>
+        <a:xfrm>
+          <a:off x="0" y="0"/>
+          <a:ext cx="0" cy="0"/>
+          <a:chOff x="0" y="0"/>
+          <a:chExt cx="0" cy="0"/>
+        </a:xfrm>
+      </p:grpSpPr>
+      <p:sp>
+        <p:nvSpPr>
+          <p:cNvPr id="2" name="Title 1"/>
+          <p:cNvSpPr>
+            <a:spLocks noGrp="1"/>
+          </p:cNvSpPr>
+          <p:nvPr>
+            <p:ph type="title"/>
+          </p:nvPr>
+        </p:nvSpPr>
+        <p:spPr>
+          <a:xfrm>
+            <a:off x="0" y="2438400"/>
+            <a:ext cx="9144000" cy="2438400"/>
+          </a:xfrm>
+        </p:spPr>
+        <p:txBody>
+          <a:bodyPr>
+            <a:normAutofit fontScale="90000"/>
+          </a:bodyPr>
+          <a:lstStyle/>
+          <a:p>
+            <a:pPr algn="ctr"/>
+            <a:r>
+              <a:rPr lang="en-US" sz="7200" b="1" dirty="0" smtClean="0">
+                <a:solidFill>
+                  <a:srgbClr val="00CC66"/>
+                </a:solidFill>
+              </a:rPr>
+              <a:t>Thanks for </a:t>
+            </a:r>
+            <a:br>
+              <a:rPr lang="en-US" sz="7200" b="1" dirty="0" smtClean="0">
+                <a:solidFill>
+                  <a:srgbClr val="00CC66"/>
+                </a:solidFill>
+              </a:rPr>
+            </a:br>
+            <a:r>
+              <a:rPr lang="en-US" sz="7200" b="1" dirty="0" smtClean="0">
+                <a:solidFill>
+                  <a:srgbClr val="00CC66"/>
+                </a:solidFill>
+              </a:rPr>
+              <a:t>your listening!</a:t>
+            </a:r>
+            <a:br>
+              <a:rPr lang="en-US" sz="7200" b="1" dirty="0" smtClean="0">
+                <a:solidFill>
+                  <a:srgbClr val="00CC66"/>
+                </a:solidFill>
+              </a:rPr>
+            </a:br>
+            <a:r>
+              <a:rPr lang="en-US" sz="7200" b="1" dirty="0" smtClean="0">
+                <a:solidFill>
+                  <a:srgbClr val="00CC66"/>
+                </a:solidFill>
+              </a:rPr>
+              <a:t>Q&amp;A</a:t>
+            </a:r>
+            <a:endParaRPr lang="en-US" sz="7200" b="1" dirty="0">
+              <a:solidFill>
+                <a:srgbClr val="00CC66"/>
+              </a:solidFill>
+            </a:endParaRPr>
+          </a:p>
+        </p:txBody>
+      </p:sp>
+      <p:pic>
+        <p:nvPicPr>
+          <p:cNvPr id="22530" name="Picture 2" descr="C:\Users\Le Phuc Lu\Desktop\Capture.PNG"/>
+          <p:cNvPicPr>
+            <a:picLocks noChangeAspect="1" noChangeArrowheads="1"/>
+          </p:cNvPicPr>
+          <p:nvPr/>
+        </p:nvPicPr>
+        <p:blipFill>
+          <a:blip r:embed="rId2">
+            <a:extLst>
+              <a:ext uri="{28A0092B-C50C-407E-A947-70E740481C1C}">
+                <a14:useLocalDpi xmlns:a14="http://schemas.microsoft.com/office/drawing/2010/main" val="0"/>
+              </a:ext>
+            </a:extLst>
+          </a:blip>
+          <a:srcRect/>
+          <a:stretch>
+            <a:fillRect/>
+          </a:stretch>
+        </p:blipFill>
+        <p:spPr bwMode="auto">
+          <a:xfrm>
+            <a:off x="7010400" y="6605031"/>
+            <a:ext cx="1676400" cy="238125"/>
+          </a:xfrm>
+          <a:prstGeom prst="rect">
+            <a:avLst/>
+          </a:prstGeom>
+          <a:noFill/>
+          <a:extLst>
+            <a:ext uri="{909E8E84-426E-40DD-AFC4-6F175D3DCCD1}">
+              <a14:hiddenFill xmlns:a14="http://schemas.microsoft.com/office/drawing/2010/main">
+                <a:solidFill>
+                  <a:srgbClr val="FFFFFF"/>
+                </a:solidFill>
+              </a14:hiddenFill>
+            </a:ext>
+          </a:extLst>
+        </p:spPr>
+      </p:pic>
+      <p:pic>
+        <p:nvPicPr>
+          <p:cNvPr id="4" name="Picture 3" descr="C:\Users\Le Phuc Lu\Desktop\1.PNG"/>
+          <p:cNvPicPr>
+            <a:picLocks noChangeAspect="1" noChangeArrowheads="1"/>
+          </p:cNvPicPr>
+          <p:nvPr/>
+        </p:nvPicPr>
+        <p:blipFill>
+          <a:blip r:embed="rId3">
+            <a:extLst>
+              <a:ext uri="{28A0092B-C50C-407E-A947-70E740481C1C}">
+                <a14:useLocalDpi xmlns:a14="http://schemas.microsoft.com/office/drawing/2010/main" val="0"/>
+              </a:ext>
+            </a:extLst>
+          </a:blip>
+          <a:srcRect/>
+          <a:stretch>
+            <a:fillRect/>
+          </a:stretch>
+        </p:blipFill>
+        <p:spPr bwMode="auto">
+          <a:xfrm>
+            <a:off x="6858000" y="0"/>
+            <a:ext cx="1828800" cy="217410"/>
+          </a:xfrm>
+          <a:prstGeom prst="rect">
+            <a:avLst/>
+          </a:prstGeom>
+          <a:noFill/>
+          <a:extLst>
+            <a:ext uri="{909E8E84-426E-40DD-AFC4-6F175D3DCCD1}">
+              <a14:hiddenFill xmlns:a14="http://schemas.microsoft.com/office/drawing/2010/main">
+                <a:solidFill>
+                  <a:srgbClr val="FFFFFF"/>
+                </a:solidFill>
+              </a14:hiddenFill>
+            </a:ext>
+          </a:extLst>
+        </p:spPr>
+      </p:pic>
+      <p:sp>
+        <p:nvSpPr>
+          <p:cNvPr id="5" name="Oval 4"/>
+          <p:cNvSpPr/>
+          <p:nvPr/>
+        </p:nvSpPr>
+        <p:spPr>
+          <a:xfrm>
+            <a:off x="8077200" y="6324600"/>
+            <a:ext cx="990600" cy="457200"/>
+          </a:xfrm>
+          <a:prstGeom prst="ellipse">
+            <a:avLst/>
+          </a:prstGeom>
+        </p:spPr>
+        <p:style>
+          <a:lnRef idx="0">
+            <a:schemeClr val="accent1"/>
+          </a:lnRef>
+          <a:fillRef idx="3">
+            <a:schemeClr val="accent1"/>
+          </a:fillRef>
+          <a:effectRef idx="3">
+            <a:schemeClr val="accent1"/>
+          </a:effectRef>
+          <a:fontRef idx="minor">
+            <a:schemeClr val="lt1"/>
+          </a:fontRef>
+        </p:style>
+        <p:txBody>
+          <a:bodyPr rtlCol="0" anchor="ctr"/>
+          <a:lstStyle/>
+          <a:p>
+            <a:pPr algn="ctr"/>
+            <a:r>
+              <a:rPr lang="en-US" sz="2000" b="1" dirty="0" smtClean="0"/>
+              <a:t>20</a:t>
+            </a:r>
+            <a:endParaRPr lang="en-US" sz="2000" b="1" dirty="0"/>
+          </a:p>
+        </p:txBody>
+      </p:sp>
+    </p:spTree>
+    <p:extLst>
+      <p:ext uri="{BB962C8B-B14F-4D97-AF65-F5344CB8AC3E}">
+        <p14:creationId xmlns:p14="http://schemas.microsoft.com/office/powerpoint/2010/main" val="2205491861"/>
+      </p:ext>
+    </p:extLst>
+  </p:cSld>
+  <p:clrMapOvr>
+    <a:masterClrMapping/>
+  </p:clrMapOvr>
+  <p:timing>
+    <p:tnLst>
+      <p:par>
+        <p:cTn id="1" dur="indefinite" restart="never" nodeType="tmRoot"/>
+      </p:par>
+    </p:tnLst>
+  </p:timing>
+</p:sld>
+</file>
+
 <file path=ppt/slides/slide2.xml><?xml version="1.0" encoding="utf-8"?>
 <p:sld xmlns:a="http://schemas.openxmlformats.org/drawingml/2006/main" xmlns:r="http://schemas.openxmlformats.org/officeDocument/2006/relationships" xmlns:p="http://schemas.openxmlformats.org/presentationml/2006/main">
   <p:cSld>
@@ -19974,236 +19666,6 @@
     <p:extLst>
       <p:ext uri="{BB962C8B-B14F-4D97-AF65-F5344CB8AC3E}">
         <p14:creationId xmlns:p14="http://schemas.microsoft.com/office/powerpoint/2010/main" val="3488681985"/>
-      </p:ext>
-    </p:extLst>
-  </p:cSld>
-  <p:clrMapOvr>
-    <a:masterClrMapping/>
-  </p:clrMapOvr>
-  <p:timing>
-    <p:tnLst>
-      <p:par>
-        <p:cTn id="1" dur="indefinite" restart="never" nodeType="tmRoot"/>
-      </p:par>
-    </p:tnLst>
-  </p:timing>
-</p:sld>
-</file>
-
-<file path=ppt/slides/slide20.xml><?xml version="1.0" encoding="utf-8"?>
-<p:sld xmlns:a="http://schemas.openxmlformats.org/drawingml/2006/main" xmlns:r="http://schemas.openxmlformats.org/officeDocument/2006/relationships" xmlns:p="http://schemas.openxmlformats.org/presentationml/2006/main">
-  <p:cSld>
-    <p:spTree>
-      <p:nvGrpSpPr>
-        <p:cNvPr id="1" name=""/>
-        <p:cNvGrpSpPr/>
-        <p:nvPr/>
-      </p:nvGrpSpPr>
-      <p:grpSpPr>
-        <a:xfrm>
-          <a:off x="0" y="0"/>
-          <a:ext cx="0" cy="0"/>
-          <a:chOff x="0" y="0"/>
-          <a:chExt cx="0" cy="0"/>
-        </a:xfrm>
-      </p:grpSpPr>
-      <p:sp>
-        <p:nvSpPr>
-          <p:cNvPr id="2" name="Title 1"/>
-          <p:cNvSpPr>
-            <a:spLocks noGrp="1"/>
-          </p:cNvSpPr>
-          <p:nvPr>
-            <p:ph type="title"/>
-          </p:nvPr>
-        </p:nvSpPr>
-        <p:spPr>
-          <a:xfrm>
-            <a:off x="0" y="2438400"/>
-            <a:ext cx="9144000" cy="2438400"/>
-          </a:xfrm>
-        </p:spPr>
-        <p:txBody>
-          <a:bodyPr>
-            <a:normAutofit fontScale="90000"/>
-          </a:bodyPr>
-          <a:lstStyle/>
-          <a:p>
-            <a:pPr algn="ctr"/>
-            <a:r>
-              <a:rPr lang="en-US" sz="7200" b="1" dirty="0" smtClean="0">
-                <a:solidFill>
-                  <a:srgbClr val="00CC66"/>
-                </a:solidFill>
-              </a:rPr>
-              <a:t>Thanks for </a:t>
-            </a:r>
-            <a:br>
-              <a:rPr lang="en-US" sz="7200" b="1" dirty="0" smtClean="0">
-                <a:solidFill>
-                  <a:srgbClr val="00CC66"/>
-                </a:solidFill>
-              </a:rPr>
-            </a:br>
-            <a:r>
-              <a:rPr lang="en-US" sz="7200" b="1" dirty="0" smtClean="0">
-                <a:solidFill>
-                  <a:srgbClr val="00CC66"/>
-                </a:solidFill>
-              </a:rPr>
-              <a:t>your listening!</a:t>
-            </a:r>
-            <a:br>
-              <a:rPr lang="en-US" sz="7200" b="1" dirty="0" smtClean="0">
-                <a:solidFill>
-                  <a:srgbClr val="00CC66"/>
-                </a:solidFill>
-              </a:rPr>
-            </a:br>
-            <a:r>
-              <a:rPr lang="en-US" sz="7200" b="1" dirty="0" smtClean="0">
-                <a:solidFill>
-                  <a:srgbClr val="00CC66"/>
-                </a:solidFill>
-              </a:rPr>
-              <a:t>Q&amp;A</a:t>
-            </a:r>
-            <a:endParaRPr lang="en-US" sz="7200" b="1" dirty="0">
-              <a:solidFill>
-                <a:srgbClr val="00CC66"/>
-              </a:solidFill>
-            </a:endParaRPr>
-          </a:p>
-        </p:txBody>
-      </p:sp>
-      <p:pic>
-        <p:nvPicPr>
-          <p:cNvPr id="22530" name="Picture 2" descr="C:\Users\Le Phuc Lu\Desktop\Capture.PNG"/>
-          <p:cNvPicPr>
-            <a:picLocks noChangeAspect="1" noChangeArrowheads="1"/>
-          </p:cNvPicPr>
-          <p:nvPr/>
-        </p:nvPicPr>
-        <p:blipFill>
-          <a:blip r:embed="rId2">
-            <a:extLst>
-              <a:ext uri="{28A0092B-C50C-407E-A947-70E740481C1C}">
-                <a14:useLocalDpi xmlns:a14="http://schemas.microsoft.com/office/drawing/2010/main" val="0"/>
-              </a:ext>
-            </a:extLst>
-          </a:blip>
-          <a:srcRect/>
-          <a:stretch>
-            <a:fillRect/>
-          </a:stretch>
-        </p:blipFill>
-        <p:spPr bwMode="auto">
-          <a:xfrm>
-            <a:off x="7010400" y="6605031"/>
-            <a:ext cx="1676400" cy="238125"/>
-          </a:xfrm>
-          <a:prstGeom prst="rect">
-            <a:avLst/>
-          </a:prstGeom>
-          <a:noFill/>
-          <a:extLst>
-            <a:ext uri="{909E8E84-426E-40DD-AFC4-6F175D3DCCD1}">
-              <a14:hiddenFill xmlns:a14="http://schemas.microsoft.com/office/drawing/2010/main">
-                <a:solidFill>
-                  <a:srgbClr val="FFFFFF"/>
-                </a:solidFill>
-              </a14:hiddenFill>
-            </a:ext>
-          </a:extLst>
-        </p:spPr>
-      </p:pic>
-      <p:pic>
-        <p:nvPicPr>
-          <p:cNvPr id="4" name="Picture 3" descr="C:\Users\Le Phuc Lu\Desktop\1.PNG"/>
-          <p:cNvPicPr>
-            <a:picLocks noChangeAspect="1" noChangeArrowheads="1"/>
-          </p:cNvPicPr>
-          <p:nvPr/>
-        </p:nvPicPr>
-        <p:blipFill>
-          <a:blip r:embed="rId3">
-            <a:extLst>
-              <a:ext uri="{28A0092B-C50C-407E-A947-70E740481C1C}">
-                <a14:useLocalDpi xmlns:a14="http://schemas.microsoft.com/office/drawing/2010/main" val="0"/>
-              </a:ext>
-            </a:extLst>
-          </a:blip>
-          <a:srcRect/>
-          <a:stretch>
-            <a:fillRect/>
-          </a:stretch>
-        </p:blipFill>
-        <p:spPr bwMode="auto">
-          <a:xfrm>
-            <a:off x="6858000" y="0"/>
-            <a:ext cx="1828800" cy="217410"/>
-          </a:xfrm>
-          <a:prstGeom prst="rect">
-            <a:avLst/>
-          </a:prstGeom>
-          <a:noFill/>
-          <a:extLst>
-            <a:ext uri="{909E8E84-426E-40DD-AFC4-6F175D3DCCD1}">
-              <a14:hiddenFill xmlns:a14="http://schemas.microsoft.com/office/drawing/2010/main">
-                <a:solidFill>
-                  <a:srgbClr val="FFFFFF"/>
-                </a:solidFill>
-              </a14:hiddenFill>
-            </a:ext>
-          </a:extLst>
-        </p:spPr>
-      </p:pic>
-      <p:sp>
-        <p:nvSpPr>
-          <p:cNvPr id="5" name="Oval 4"/>
-          <p:cNvSpPr/>
-          <p:nvPr/>
-        </p:nvSpPr>
-        <p:spPr>
-          <a:xfrm>
-            <a:off x="8077200" y="6324600"/>
-            <a:ext cx="990600" cy="457200"/>
-          </a:xfrm>
-          <a:prstGeom prst="ellipse">
-            <a:avLst/>
-          </a:prstGeom>
-        </p:spPr>
-        <p:style>
-          <a:lnRef idx="0">
-            <a:schemeClr val="accent1"/>
-          </a:lnRef>
-          <a:fillRef idx="3">
-            <a:schemeClr val="accent1"/>
-          </a:fillRef>
-          <a:effectRef idx="3">
-            <a:schemeClr val="accent1"/>
-          </a:effectRef>
-          <a:fontRef idx="minor">
-            <a:schemeClr val="lt1"/>
-          </a:fontRef>
-        </p:style>
-        <p:txBody>
-          <a:bodyPr rtlCol="0" anchor="ctr"/>
-          <a:lstStyle/>
-          <a:p>
-            <a:pPr algn="ctr"/>
-            <a:r>
-              <a:rPr lang="en-US" sz="2000" b="1" dirty="0" smtClean="0"/>
-              <a:t>20</a:t>
-            </a:r>
-            <a:endParaRPr lang="en-US" sz="2000" b="1" dirty="0"/>
-          </a:p>
-        </p:txBody>
-      </p:sp>
-    </p:spTree>
-    <p:extLst>
-      <p:ext uri="{BB962C8B-B14F-4D97-AF65-F5344CB8AC3E}">
-        <p14:creationId xmlns:p14="http://schemas.microsoft.com/office/powerpoint/2010/main" val="2205491861"/>
       </p:ext>
     </p:extLst>
   </p:cSld>
@@ -26299,7 +25761,15 @@
                   <a:srgbClr val="7030A0"/>
                 </a:solidFill>
               </a:rPr>
-              <a:t>26 May 2014</a:t>
+              <a:t>07 May </a:t>
+            </a:r>
+            <a:r>
+              <a:rPr lang="en-US" dirty="0" smtClean="0">
+                <a:solidFill>
+                  <a:srgbClr val="7030A0"/>
+                </a:solidFill>
+              </a:rPr>
+              <a:t>2014</a:t>
             </a:r>
             <a:endParaRPr lang="en-US" dirty="0">
               <a:solidFill>
@@ -27872,7 +27342,7 @@
                             </p:stCondLst>
                             <p:childTnLst>
                               <p:par>
-                                <p:cTn id="95" presetID="26" presetClass="entr" presetSubtype="0" fill="hold" nodeType="clickEffect">
+                                <p:cTn id="95" presetID="14" presetClass="entr" presetSubtype="10" fill="hold" nodeType="clickEffect">
                                   <p:stCondLst>
                                     <p:cond delay="0"/>
                                   </p:stCondLst>
@@ -27895,257 +27365,14 @@
                                         <p:strVal val="visible"/>
                                       </p:to>
                                     </p:set>
-                                    <p:animEffect transition="in" filter="wipe(down)">
+                                    <p:animEffect transition="in" filter="randombar(horizontal)">
                                       <p:cBhvr>
-                                        <p:cTn id="97" dur="580">
-                                          <p:stCondLst>
-                                            <p:cond delay="0"/>
-                                          </p:stCondLst>
-                                        </p:cTn>
+                                        <p:cTn id="97" dur="500"/>
                                         <p:tgtEl>
                                           <p:spTgt spid="3074"/>
                                         </p:tgtEl>
                                       </p:cBhvr>
                                     </p:animEffect>
-                                    <p:anim calcmode="lin" valueType="num">
-                                      <p:cBhvr>
-                                        <p:cTn id="98" dur="1822" tmFilter="0,0; 0.14,0.36; 0.43,0.73; 0.71,0.91; 1.0,1.0">
-                                          <p:stCondLst>
-                                            <p:cond delay="0"/>
-                                          </p:stCondLst>
-                                        </p:cTn>
-                                        <p:tgtEl>
-                                          <p:spTgt spid="3074"/>
-                                        </p:tgtEl>
-                                        <p:attrNameLst>
-                                          <p:attrName>ppt_x</p:attrName>
-                                        </p:attrNameLst>
-                                      </p:cBhvr>
-                                      <p:tavLst>
-                                        <p:tav tm="0">
-                                          <p:val>
-                                            <p:strVal val="#ppt_x-0.25"/>
-                                          </p:val>
-                                        </p:tav>
-                                        <p:tav tm="100000">
-                                          <p:val>
-                                            <p:strVal val="#ppt_x"/>
-                                          </p:val>
-                                        </p:tav>
-                                      </p:tavLst>
-                                    </p:anim>
-                                    <p:anim calcmode="lin" valueType="num">
-                                      <p:cBhvr>
-                                        <p:cTn id="99" dur="664" tmFilter="0.0,0.0; 0.25,0.07; 0.50,0.2; 0.75,0.467; 1.0,1.0">
-                                          <p:stCondLst>
-                                            <p:cond delay="0"/>
-                                          </p:stCondLst>
-                                        </p:cTn>
-                                        <p:tgtEl>
-                                          <p:spTgt spid="3074"/>
-                                        </p:tgtEl>
-                                        <p:attrNameLst>
-                                          <p:attrName>ppt_y</p:attrName>
-                                        </p:attrNameLst>
-                                      </p:cBhvr>
-                                      <p:tavLst>
-                                        <p:tav tm="0" fmla="#ppt_y-sin(pi*$)/3">
-                                          <p:val>
-                                            <p:fltVal val="0.5"/>
-                                          </p:val>
-                                        </p:tav>
-                                        <p:tav tm="100000">
-                                          <p:val>
-                                            <p:fltVal val="1"/>
-                                          </p:val>
-                                        </p:tav>
-                                      </p:tavLst>
-                                    </p:anim>
-                                    <p:anim calcmode="lin" valueType="num">
-                                      <p:cBhvr>
-                                        <p:cTn id="100" dur="664" tmFilter="0, 0; 0.125,0.2665; 0.25,0.4; 0.375,0.465; 0.5,0.5;  0.625,0.535; 0.75,0.6; 0.875,0.7335; 1,1">
-                                          <p:stCondLst>
-                                            <p:cond delay="664"/>
-                                          </p:stCondLst>
-                                        </p:cTn>
-                                        <p:tgtEl>
-                                          <p:spTgt spid="3074"/>
-                                        </p:tgtEl>
-                                        <p:attrNameLst>
-                                          <p:attrName>ppt_y</p:attrName>
-                                        </p:attrNameLst>
-                                      </p:cBhvr>
-                                      <p:tavLst>
-                                        <p:tav tm="0" fmla="#ppt_y-sin(pi*$)/9">
-                                          <p:val>
-                                            <p:fltVal val="0"/>
-                                          </p:val>
-                                        </p:tav>
-                                        <p:tav tm="100000">
-                                          <p:val>
-                                            <p:fltVal val="1"/>
-                                          </p:val>
-                                        </p:tav>
-                                      </p:tavLst>
-                                    </p:anim>
-                                    <p:anim calcmode="lin" valueType="num">
-                                      <p:cBhvr>
-                                        <p:cTn id="101" dur="332" tmFilter="0, 0; 0.125,0.2665; 0.25,0.4; 0.375,0.465; 0.5,0.5;  0.625,0.535; 0.75,0.6; 0.875,0.7335; 1,1">
-                                          <p:stCondLst>
-                                            <p:cond delay="1324"/>
-                                          </p:stCondLst>
-                                        </p:cTn>
-                                        <p:tgtEl>
-                                          <p:spTgt spid="3074"/>
-                                        </p:tgtEl>
-                                        <p:attrNameLst>
-                                          <p:attrName>ppt_y</p:attrName>
-                                        </p:attrNameLst>
-                                      </p:cBhvr>
-                                      <p:tavLst>
-                                        <p:tav tm="0" fmla="#ppt_y-sin(pi*$)/27">
-                                          <p:val>
-                                            <p:fltVal val="0"/>
-                                          </p:val>
-                                        </p:tav>
-                                        <p:tav tm="100000">
-                                          <p:val>
-                                            <p:fltVal val="1"/>
-                                          </p:val>
-                                        </p:tav>
-                                      </p:tavLst>
-                                    </p:anim>
-                                    <p:anim calcmode="lin" valueType="num">
-                                      <p:cBhvr>
-                                        <p:cTn id="102" dur="164" tmFilter="0, 0; 0.125,0.2665; 0.25,0.4; 0.375,0.465; 0.5,0.5;  0.625,0.535; 0.75,0.6; 0.875,0.7335; 1,1">
-                                          <p:stCondLst>
-                                            <p:cond delay="1656"/>
-                                          </p:stCondLst>
-                                        </p:cTn>
-                                        <p:tgtEl>
-                                          <p:spTgt spid="3074"/>
-                                        </p:tgtEl>
-                                        <p:attrNameLst>
-                                          <p:attrName>ppt_y</p:attrName>
-                                        </p:attrNameLst>
-                                      </p:cBhvr>
-                                      <p:tavLst>
-                                        <p:tav tm="0" fmla="#ppt_y-sin(pi*$)/81">
-                                          <p:val>
-                                            <p:fltVal val="0"/>
-                                          </p:val>
-                                        </p:tav>
-                                        <p:tav tm="100000">
-                                          <p:val>
-                                            <p:fltVal val="1"/>
-                                          </p:val>
-                                        </p:tav>
-                                      </p:tavLst>
-                                    </p:anim>
-                                    <p:animScale>
-                                      <p:cBhvr>
-                                        <p:cTn id="103" dur="26">
-                                          <p:stCondLst>
-                                            <p:cond delay="650"/>
-                                          </p:stCondLst>
-                                        </p:cTn>
-                                        <p:tgtEl>
-                                          <p:spTgt spid="3074"/>
-                                        </p:tgtEl>
-                                      </p:cBhvr>
-                                      <p:to x="100000" y="60000"/>
-                                    </p:animScale>
-                                    <p:animScale>
-                                      <p:cBhvr>
-                                        <p:cTn id="104" dur="166" decel="50000">
-                                          <p:stCondLst>
-                                            <p:cond delay="676"/>
-                                          </p:stCondLst>
-                                        </p:cTn>
-                                        <p:tgtEl>
-                                          <p:spTgt spid="3074"/>
-                                        </p:tgtEl>
-                                      </p:cBhvr>
-                                      <p:to x="100000" y="100000"/>
-                                    </p:animScale>
-                                    <p:animScale>
-                                      <p:cBhvr>
-                                        <p:cTn id="105" dur="26">
-                                          <p:stCondLst>
-                                            <p:cond delay="1312"/>
-                                          </p:stCondLst>
-                                        </p:cTn>
-                                        <p:tgtEl>
-                                          <p:spTgt spid="3074"/>
-                                        </p:tgtEl>
-                                      </p:cBhvr>
-                                      <p:to x="100000" y="80000"/>
-                                    </p:animScale>
-                                    <p:animScale>
-                                      <p:cBhvr>
-                                        <p:cTn id="106" dur="166" decel="50000">
-                                          <p:stCondLst>
-                                            <p:cond delay="1338"/>
-                                          </p:stCondLst>
-                                        </p:cTn>
-                                        <p:tgtEl>
-                                          <p:spTgt spid="3074"/>
-                                        </p:tgtEl>
-                                      </p:cBhvr>
-                                      <p:to x="100000" y="100000"/>
-                                    </p:animScale>
-                                    <p:animScale>
-                                      <p:cBhvr>
-                                        <p:cTn id="107" dur="26">
-                                          <p:stCondLst>
-                                            <p:cond delay="1642"/>
-                                          </p:stCondLst>
-                                        </p:cTn>
-                                        <p:tgtEl>
-                                          <p:spTgt spid="3074"/>
-                                        </p:tgtEl>
-                                      </p:cBhvr>
-                                      <p:to x="100000" y="90000"/>
-                                    </p:animScale>
-                                    <p:animScale>
-                                      <p:cBhvr>
-                                        <p:cTn id="108" dur="166" decel="50000">
-                                          <p:stCondLst>
-                                            <p:cond delay="1668"/>
-                                          </p:stCondLst>
-                                        </p:cTn>
-                                        <p:tgtEl>
-                                          <p:spTgt spid="3074"/>
-                                        </p:tgtEl>
-                                      </p:cBhvr>
-                                      <p:to x="100000" y="100000"/>
-                                    </p:animScale>
-                                    <p:animScale>
-                                      <p:cBhvr>
-                                        <p:cTn id="109" dur="26">
-                                          <p:stCondLst>
-                                            <p:cond delay="1808"/>
-                                          </p:stCondLst>
-                                        </p:cTn>
-                                        <p:tgtEl>
-                                          <p:spTgt spid="3074"/>
-                                        </p:tgtEl>
-                                      </p:cBhvr>
-                                      <p:to x="100000" y="95000"/>
-                                    </p:animScale>
-                                    <p:animScale>
-                                      <p:cBhvr>
-                                        <p:cTn id="110" dur="166" decel="50000">
-                                          <p:stCondLst>
-                                            <p:cond delay="1834"/>
-                                          </p:stCondLst>
-                                        </p:cTn>
-                                        <p:tgtEl>
-                                          <p:spTgt spid="3074"/>
-                                        </p:tgtEl>
-                                      </p:cBhvr>
-                                      <p:to x="100000" y="100000"/>
-                                    </p:animScale>
                                   </p:childTnLst>
                                 </p:cTn>
                               </p:par>
@@ -28156,26 +27383,26 @@
                     </p:cTn>
                   </p:par>
                   <p:par>
-                    <p:cTn id="111" fill="hold">
+                    <p:cTn id="98" fill="hold">
                       <p:stCondLst>
                         <p:cond delay="indefinite"/>
                       </p:stCondLst>
                       <p:childTnLst>
                         <p:par>
-                          <p:cTn id="112" fill="hold">
+                          <p:cTn id="99" fill="hold">
                             <p:stCondLst>
                               <p:cond delay="0"/>
                             </p:stCondLst>
                             <p:childTnLst>
                               <p:par>
-                                <p:cTn id="113" presetID="10" presetClass="entr" presetSubtype="0" fill="hold" grpId="0" nodeType="clickEffect">
+                                <p:cTn id="100" presetID="10" presetClass="entr" presetSubtype="0" fill="hold" grpId="0" nodeType="clickEffect">
                                   <p:stCondLst>
                                     <p:cond delay="0"/>
                                   </p:stCondLst>
                                   <p:childTnLst>
                                     <p:set>
                                       <p:cBhvr>
-                                        <p:cTn id="114" dur="1" fill="hold">
+                                        <p:cTn id="101" dur="1" fill="hold">
                                           <p:stCondLst>
                                             <p:cond delay="0"/>
                                           </p:stCondLst>
@@ -28193,7 +27420,7 @@
                                     </p:set>
                                     <p:animEffect transition="in" filter="fade">
                                       <p:cBhvr>
-                                        <p:cTn id="115" dur="500"/>
+                                        <p:cTn id="102" dur="500"/>
                                         <p:tgtEl>
                                           <p:spTgt spid="3077"/>
                                         </p:tgtEl>
@@ -28209,26 +27436,26 @@
                     </p:cTn>
                   </p:par>
                   <p:par>
-                    <p:cTn id="116" fill="hold">
+                    <p:cTn id="103" fill="hold">
                       <p:stCondLst>
                         <p:cond delay="indefinite"/>
                       </p:stCondLst>
                       <p:childTnLst>
                         <p:par>
-                          <p:cTn id="117" fill="hold">
+                          <p:cTn id="104" fill="hold">
                             <p:stCondLst>
                               <p:cond delay="0"/>
                             </p:stCondLst>
                             <p:childTnLst>
                               <p:par>
-                                <p:cTn id="118" presetID="16" presetClass="exit" presetSubtype="21" fill="hold" grpId="1" nodeType="clickEffect">
+                                <p:cTn id="105" presetID="16" presetClass="exit" presetSubtype="21" fill="hold" grpId="1" nodeType="clickEffect">
                                   <p:stCondLst>
                                     <p:cond delay="0"/>
                                   </p:stCondLst>
                                   <p:childTnLst>
                                     <p:animEffect transition="out" filter="barn(inVertical)">
                                       <p:cBhvr>
-                                        <p:cTn id="119" dur="500"/>
+                                        <p:cTn id="106" dur="500"/>
                                         <p:tgtEl>
                                           <p:spTgt spid="3077"/>
                                         </p:tgtEl>
@@ -28236,7 +27463,7 @@
                                     </p:animEffect>
                                     <p:set>
                                       <p:cBhvr>
-                                        <p:cTn id="120" dur="1" fill="hold">
+                                        <p:cTn id="107" dur="1" fill="hold">
                                           <p:stCondLst>
                                             <p:cond delay="499"/>
                                           </p:stCondLst>
@@ -28262,26 +27489,26 @@
                     </p:cTn>
                   </p:par>
                   <p:par>
-                    <p:cTn id="121" fill="hold">
+                    <p:cTn id="108" fill="hold">
                       <p:stCondLst>
                         <p:cond delay="indefinite"/>
                       </p:stCondLst>
                       <p:childTnLst>
                         <p:par>
-                          <p:cTn id="122" fill="hold">
+                          <p:cTn id="109" fill="hold">
                             <p:stCondLst>
                               <p:cond delay="0"/>
                             </p:stCondLst>
                             <p:childTnLst>
                               <p:par>
-                                <p:cTn id="123" presetID="10" presetClass="exit" presetSubtype="0" fill="hold" grpId="1" nodeType="clickEffect">
+                                <p:cTn id="110" presetID="10" presetClass="exit" presetSubtype="0" fill="hold" grpId="1" nodeType="clickEffect">
                                   <p:stCondLst>
                                     <p:cond delay="0"/>
                                   </p:stCondLst>
                                   <p:childTnLst>
                                     <p:animEffect transition="out" filter="fade">
                                       <p:cBhvr>
-                                        <p:cTn id="124" dur="500"/>
+                                        <p:cTn id="111" dur="500"/>
                                         <p:tgtEl>
                                           <p:spTgt spid="74"/>
                                         </p:tgtEl>
@@ -28289,7 +27516,7 @@
                                     </p:animEffect>
                                     <p:set>
                                       <p:cBhvr>
-                                        <p:cTn id="125" dur="1" fill="hold">
+                                        <p:cTn id="112" dur="1" fill="hold">
                                           <p:stCondLst>
                                             <p:cond delay="499"/>
                                           </p:stCondLst>
@@ -28315,26 +27542,26 @@
                     </p:cTn>
                   </p:par>
                   <p:par>
-                    <p:cTn id="126" fill="hold">
+                    <p:cTn id="113" fill="hold">
                       <p:stCondLst>
                         <p:cond delay="indefinite"/>
                       </p:stCondLst>
                       <p:childTnLst>
                         <p:par>
-                          <p:cTn id="127" fill="hold">
+                          <p:cTn id="114" fill="hold">
                             <p:stCondLst>
                               <p:cond delay="0"/>
                             </p:stCondLst>
                             <p:childTnLst>
                               <p:par>
-                                <p:cTn id="128" presetID="42" presetClass="entr" presetSubtype="0" fill="hold" grpId="0" nodeType="clickEffect">
+                                <p:cTn id="115" presetID="42" presetClass="entr" presetSubtype="0" fill="hold" grpId="0" nodeType="clickEffect">
                                   <p:stCondLst>
                                     <p:cond delay="0"/>
                                   </p:stCondLst>
                                   <p:childTnLst>
                                     <p:set>
                                       <p:cBhvr>
-                                        <p:cTn id="129" dur="1" fill="hold">
+                                        <p:cTn id="116" dur="1" fill="hold">
                                           <p:stCondLst>
                                             <p:cond delay="0"/>
                                           </p:stCondLst>
@@ -28352,7 +27579,7 @@
                                     </p:set>
                                     <p:animEffect transition="in" filter="fade">
                                       <p:cBhvr>
-                                        <p:cTn id="130" dur="1000"/>
+                                        <p:cTn id="117" dur="1000"/>
                                         <p:tgtEl>
                                           <p:spTgt spid="76"/>
                                         </p:tgtEl>
@@ -28360,7 +27587,7 @@
                                     </p:animEffect>
                                     <p:anim calcmode="lin" valueType="num">
                                       <p:cBhvr>
-                                        <p:cTn id="131" dur="1000" fill="hold"/>
+                                        <p:cTn id="118" dur="1000" fill="hold"/>
                                         <p:tgtEl>
                                           <p:spTgt spid="76"/>
                                         </p:tgtEl>
@@ -28383,7 +27610,7 @@
                                     </p:anim>
                                     <p:anim calcmode="lin" valueType="num">
                                       <p:cBhvr>
-                                        <p:cTn id="132" dur="1000" fill="hold"/>
+                                        <p:cTn id="119" dur="1000" fill="hold"/>
                                         <p:tgtEl>
                                           <p:spTgt spid="76"/>
                                         </p:tgtEl>
@@ -28414,26 +27641,26 @@
                     </p:cTn>
                   </p:par>
                   <p:par>
-                    <p:cTn id="133" fill="hold">
+                    <p:cTn id="120" fill="hold">
                       <p:stCondLst>
                         <p:cond delay="indefinite"/>
                       </p:stCondLst>
                       <p:childTnLst>
                         <p:par>
-                          <p:cTn id="134" fill="hold">
+                          <p:cTn id="121" fill="hold">
                             <p:stCondLst>
                               <p:cond delay="0"/>
                             </p:stCondLst>
                             <p:childTnLst>
                               <p:par>
-                                <p:cTn id="135" presetID="42" presetClass="entr" presetSubtype="0" fill="hold" grpId="0" nodeType="clickEffect">
+                                <p:cTn id="122" presetID="42" presetClass="entr" presetSubtype="0" fill="hold" grpId="0" nodeType="clickEffect">
                                   <p:stCondLst>
                                     <p:cond delay="0"/>
                                   </p:stCondLst>
                                   <p:childTnLst>
                                     <p:set>
                                       <p:cBhvr>
-                                        <p:cTn id="136" dur="1" fill="hold">
+                                        <p:cTn id="123" dur="1" fill="hold">
                                           <p:stCondLst>
                                             <p:cond delay="0"/>
                                           </p:stCondLst>
@@ -28451,7 +27678,7 @@
                                     </p:set>
                                     <p:animEffect transition="in" filter="fade">
                                       <p:cBhvr>
-                                        <p:cTn id="137" dur="1000"/>
+                                        <p:cTn id="124" dur="1000"/>
                                         <p:tgtEl>
                                           <p:spTgt spid="3073"/>
                                         </p:tgtEl>
@@ -28459,7 +27686,7 @@
                                     </p:animEffect>
                                     <p:anim calcmode="lin" valueType="num">
                                       <p:cBhvr>
-                                        <p:cTn id="138" dur="1000" fill="hold"/>
+                                        <p:cTn id="125" dur="1000" fill="hold"/>
                                         <p:tgtEl>
                                           <p:spTgt spid="3073"/>
                                         </p:tgtEl>
@@ -28482,7 +27709,7 @@
                                     </p:anim>
                                     <p:anim calcmode="lin" valueType="num">
                                       <p:cBhvr>
-                                        <p:cTn id="139" dur="1000" fill="hold"/>
+                                        <p:cTn id="126" dur="1000" fill="hold"/>
                                         <p:tgtEl>
                                           <p:spTgt spid="3073"/>
                                         </p:tgtEl>
@@ -28513,26 +27740,26 @@
                     </p:cTn>
                   </p:par>
                   <p:par>
-                    <p:cTn id="140" fill="hold">
+                    <p:cTn id="127" fill="hold">
                       <p:stCondLst>
                         <p:cond delay="indefinite"/>
                       </p:stCondLst>
                       <p:childTnLst>
                         <p:par>
-                          <p:cTn id="141" fill="hold">
+                          <p:cTn id="128" fill="hold">
                             <p:stCondLst>
                               <p:cond delay="0"/>
                             </p:stCondLst>
                             <p:childTnLst>
                               <p:par>
-                                <p:cTn id="142" presetID="10" presetClass="exit" presetSubtype="0" fill="hold" grpId="1" nodeType="clickEffect">
+                                <p:cTn id="129" presetID="10" presetClass="exit" presetSubtype="0" fill="hold" grpId="1" nodeType="clickEffect">
                                   <p:stCondLst>
                                     <p:cond delay="0"/>
                                   </p:stCondLst>
                                   <p:childTnLst>
                                     <p:animEffect transition="out" filter="fade">
                                       <p:cBhvr>
-                                        <p:cTn id="143" dur="500"/>
+                                        <p:cTn id="130" dur="500"/>
                                         <p:tgtEl>
                                           <p:spTgt spid="76"/>
                                         </p:tgtEl>
@@ -28540,7 +27767,7 @@
                                     </p:animEffect>
                                     <p:set>
                                       <p:cBhvr>
-                                        <p:cTn id="144" dur="1" fill="hold">
+                                        <p:cTn id="131" dur="1" fill="hold">
                                           <p:stCondLst>
                                             <p:cond delay="499"/>
                                           </p:stCondLst>
@@ -28566,26 +27793,26 @@
                     </p:cTn>
                   </p:par>
                   <p:par>
-                    <p:cTn id="145" fill="hold">
+                    <p:cTn id="132" fill="hold">
                       <p:stCondLst>
                         <p:cond delay="indefinite"/>
                       </p:stCondLst>
                       <p:childTnLst>
                         <p:par>
-                          <p:cTn id="146" fill="hold">
+                          <p:cTn id="133" fill="hold">
                             <p:stCondLst>
                               <p:cond delay="0"/>
                             </p:stCondLst>
                             <p:childTnLst>
                               <p:par>
-                                <p:cTn id="147" presetID="42" presetClass="entr" presetSubtype="0" fill="hold" grpId="0" nodeType="clickEffect">
+                                <p:cTn id="134" presetID="42" presetClass="entr" presetSubtype="0" fill="hold" grpId="0" nodeType="clickEffect">
                                   <p:stCondLst>
                                     <p:cond delay="0"/>
                                   </p:stCondLst>
                                   <p:childTnLst>
                                     <p:set>
                                       <p:cBhvr>
-                                        <p:cTn id="148" dur="1" fill="hold">
+                                        <p:cTn id="135" dur="1" fill="hold">
                                           <p:stCondLst>
                                             <p:cond delay="0"/>
                                           </p:stCondLst>
@@ -28603,7 +27830,7 @@
                                     </p:set>
                                     <p:animEffect transition="in" filter="fade">
                                       <p:cBhvr>
-                                        <p:cTn id="149" dur="1000"/>
+                                        <p:cTn id="136" dur="1000"/>
                                         <p:tgtEl>
                                           <p:spTgt spid="77"/>
                                         </p:tgtEl>
@@ -28611,7 +27838,7 @@
                                     </p:animEffect>
                                     <p:anim calcmode="lin" valueType="num">
                                       <p:cBhvr>
-                                        <p:cTn id="150" dur="1000" fill="hold"/>
+                                        <p:cTn id="137" dur="1000" fill="hold"/>
                                         <p:tgtEl>
                                           <p:spTgt spid="77"/>
                                         </p:tgtEl>
@@ -28634,7 +27861,7 @@
                                     </p:anim>
                                     <p:anim calcmode="lin" valueType="num">
                                       <p:cBhvr>
-                                        <p:cTn id="151" dur="1000" fill="hold"/>
+                                        <p:cTn id="138" dur="1000" fill="hold"/>
                                         <p:tgtEl>
                                           <p:spTgt spid="77"/>
                                         </p:tgtEl>
@@ -28665,26 +27892,26 @@
                     </p:cTn>
                   </p:par>
                   <p:par>
-                    <p:cTn id="152" fill="hold">
+                    <p:cTn id="139" fill="hold">
                       <p:stCondLst>
                         <p:cond delay="indefinite"/>
                       </p:stCondLst>
                       <p:childTnLst>
                         <p:par>
-                          <p:cTn id="153" fill="hold">
+                          <p:cTn id="140" fill="hold">
                             <p:stCondLst>
                               <p:cond delay="0"/>
                             </p:stCondLst>
                             <p:childTnLst>
                               <p:par>
-                                <p:cTn id="154" presetID="10" presetClass="entr" presetSubtype="0" fill="hold" grpId="0" nodeType="clickEffect">
+                                <p:cTn id="141" presetID="10" presetClass="entr" presetSubtype="0" fill="hold" grpId="0" nodeType="clickEffect">
                                   <p:stCondLst>
                                     <p:cond delay="0"/>
                                   </p:stCondLst>
                                   <p:childTnLst>
                                     <p:set>
                                       <p:cBhvr>
-                                        <p:cTn id="155" dur="1" fill="hold">
+                                        <p:cTn id="142" dur="1" fill="hold">
                                           <p:stCondLst>
                                             <p:cond delay="0"/>
                                           </p:stCondLst>
@@ -28702,7 +27929,7 @@
                                     </p:set>
                                     <p:animEffect transition="in" filter="fade">
                                       <p:cBhvr>
-                                        <p:cTn id="156" dur="500"/>
+                                        <p:cTn id="143" dur="500"/>
                                         <p:tgtEl>
                                           <p:spTgt spid="71"/>
                                         </p:tgtEl>
@@ -28718,26 +27945,26 @@
                     </p:cTn>
                   </p:par>
                   <p:par>
-                    <p:cTn id="157" fill="hold">
+                    <p:cTn id="144" fill="hold">
                       <p:stCondLst>
                         <p:cond delay="indefinite"/>
                       </p:stCondLst>
                       <p:childTnLst>
                         <p:par>
-                          <p:cTn id="158" fill="hold">
+                          <p:cTn id="145" fill="hold">
                             <p:stCondLst>
                               <p:cond delay="0"/>
                             </p:stCondLst>
                             <p:childTnLst>
                               <p:par>
-                                <p:cTn id="159" presetID="56" presetClass="path" presetSubtype="0" accel="50000" decel="50000" fill="hold" nodeType="clickEffect">
+                                <p:cTn id="146" presetID="56" presetClass="path" presetSubtype="0" accel="50000" decel="50000" fill="hold" nodeType="clickEffect">
                                   <p:stCondLst>
                                     <p:cond delay="0"/>
                                   </p:stCondLst>
                                   <p:childTnLst>
                                     <p:animMotion origin="layout" path="M -2.5E-6 -4.07407E-6 L 0.80469 -0.06782 " pathEditMode="relative" rAng="0" ptsTypes="AA">
                                       <p:cBhvr>
-                                        <p:cTn id="160" dur="2000" fill="hold"/>
+                                        <p:cTn id="147" dur="2000" fill="hold"/>
                                         <p:tgtEl>
                                           <p:spTgt spid="3074"/>
                                         </p:tgtEl>
@@ -28857,7 +28084,7 @@
             <p:ph idx="1"/>
             <p:extLst>
               <p:ext uri="{D42A27DB-BD31-4B8C-83A1-F6EECF244321}">
-                <p14:modId xmlns:p14="http://schemas.microsoft.com/office/powerpoint/2010/main" val="3077121809"/>
+                <p14:modId xmlns:p14="http://schemas.microsoft.com/office/powerpoint/2010/main" val="231756387"/>
               </p:ext>
             </p:extLst>
           </p:nvPr>
@@ -29212,7 +28439,7 @@
                       <a:pPr algn="ctr"/>
                       <a:r>
                         <a:rPr lang="en-US" dirty="0" smtClean="0"/>
-                        <a:t>30</a:t>
+                        <a:t>300</a:t>
                       </a:r>
                       <a:endParaRPr lang="en-US" dirty="0"/>
                     </a:p>
@@ -29892,7 +29119,11 @@
             </a:r>
             <a:r>
               <a:rPr lang="en-US" sz="2400" b="0" dirty="0" smtClean="0"/>
-              <a:t> these </a:t>
+              <a:t> </a:t>
+            </a:r>
+            <a:r>
+              <a:rPr lang="en-US" sz="2400" b="0" dirty="0" smtClean="0"/>
+              <a:t>these </a:t>
             </a:r>
             <a:r>
               <a:rPr lang="en-US" sz="2400" i="1" dirty="0" smtClean="0"/>
@@ -29908,8 +29139,13 @@
             </a:r>
             <a:r>
               <a:rPr lang="en-US" sz="2400" b="0" dirty="0" smtClean="0"/>
-              <a:t> about: volume, time.</a:t>
-            </a:r>
+              <a:t> about: volume, </a:t>
+            </a:r>
+            <a:r>
+              <a:rPr lang="en-US" sz="2400" b="0" dirty="0" smtClean="0"/>
+              <a:t>time,… to get maximum revenue.</a:t>
+            </a:r>
+            <a:endParaRPr lang="en-US" sz="2400" b="0" dirty="0" smtClean="0"/>
           </a:p>
           <a:p>
             <a:pPr marL="0" indent="0">

</xml_diff>